<commit_message>
add images to pptx
</commit_message>
<xml_diff>
--- a/images/processing_images.pptx
+++ b/images/processing_images.pptx
@@ -5,7 +5,7 @@
     <p:sldMasterId id="2147483648" r:id="rId1"/>
   </p:sldMasterIdLst>
   <p:notesMasterIdLst>
-    <p:notesMasterId r:id="rId7"/>
+    <p:notesMasterId r:id="rId15"/>
   </p:notesMasterIdLst>
   <p:sldIdLst>
     <p:sldId id="256" r:id="rId2"/>
@@ -13,6 +13,14 @@
     <p:sldId id="258" r:id="rId4"/>
     <p:sldId id="328" r:id="rId5"/>
     <p:sldId id="329" r:id="rId6"/>
+    <p:sldId id="330" r:id="rId7"/>
+    <p:sldId id="331" r:id="rId8"/>
+    <p:sldId id="332" r:id="rId9"/>
+    <p:sldId id="5639" r:id="rId10"/>
+    <p:sldId id="5638" r:id="rId11"/>
+    <p:sldId id="5637" r:id="rId12"/>
+    <p:sldId id="5640" r:id="rId13"/>
+    <p:sldId id="5641" r:id="rId14"/>
   </p:sldIdLst>
   <p:sldSz cx="12192000" cy="6858000"/>
   <p:notesSz cx="6858000" cy="9144000"/>
@@ -698,6 +706,551 @@
 </p:notes>
 </file>
 
+<file path=ppt/notesSlides/notesSlide3.xml><?xml version="1.0" encoding="utf-8"?>
+<p:notes xmlns:a="http://schemas.openxmlformats.org/drawingml/2006/main" xmlns:r="http://schemas.openxmlformats.org/officeDocument/2006/relationships" xmlns:p="http://schemas.openxmlformats.org/presentationml/2006/main" showMasterSp="0" showMasterPhAnim="0">
+  <p:cSld>
+    <p:spTree>
+      <p:nvGrpSpPr>
+        <p:cNvPr id="1" name="Shape 57"/>
+        <p:cNvGrpSpPr/>
+        <p:nvPr/>
+      </p:nvGrpSpPr>
+      <p:grpSpPr>
+        <a:xfrm>
+          <a:off x="0" y="0"/>
+          <a:ext cx="0" cy="0"/>
+          <a:chOff x="0" y="0"/>
+          <a:chExt cx="0" cy="0"/>
+        </a:xfrm>
+      </p:grpSpPr>
+      <p:sp>
+        <p:nvSpPr>
+          <p:cNvPr id="58" name="Google Shape;58;gf035d46749_0_0:notes"/>
+          <p:cNvSpPr>
+            <a:spLocks noGrp="1" noRot="1" noChangeAspect="1"/>
+          </p:cNvSpPr>
+          <p:nvPr>
+            <p:ph type="sldImg" idx="2"/>
+          </p:nvPr>
+        </p:nvSpPr>
+        <p:spPr>
+          <a:xfrm>
+            <a:off x="381000" y="685800"/>
+            <a:ext cx="6096000" cy="3429000"/>
+          </a:xfrm>
+          <a:custGeom>
+            <a:avLst/>
+            <a:gdLst/>
+            <a:ahLst/>
+            <a:cxnLst/>
+            <a:rect l="l" t="t" r="r" b="b"/>
+            <a:pathLst>
+              <a:path w="120000" h="120000" extrusionOk="0">
+                <a:moveTo>
+                  <a:pt x="0" y="0"/>
+                </a:moveTo>
+                <a:lnTo>
+                  <a:pt x="120000" y="0"/>
+                </a:lnTo>
+                <a:lnTo>
+                  <a:pt x="120000" y="120000"/>
+                </a:lnTo>
+                <a:lnTo>
+                  <a:pt x="0" y="120000"/>
+                </a:lnTo>
+                <a:close/>
+              </a:path>
+            </a:pathLst>
+          </a:custGeom>
+        </p:spPr>
+      </p:sp>
+      <p:sp>
+        <p:nvSpPr>
+          <p:cNvPr id="59" name="Google Shape;59;gf035d46749_0_0:notes"/>
+          <p:cNvSpPr txBox="1">
+            <a:spLocks noGrp="1"/>
+          </p:cNvSpPr>
+          <p:nvPr>
+            <p:ph type="body" idx="1"/>
+          </p:nvPr>
+        </p:nvSpPr>
+        <p:spPr>
+          <a:xfrm>
+            <a:off x="685800" y="4343400"/>
+            <a:ext cx="5486400" cy="4114800"/>
+          </a:xfrm>
+          <a:prstGeom prst="rect">
+            <a:avLst/>
+          </a:prstGeom>
+        </p:spPr>
+        <p:txBody>
+          <a:bodyPr spcFirstLastPara="1" wrap="square" lIns="91425" tIns="91425" rIns="91425" bIns="91425" anchor="t" anchorCtr="0">
+            <a:noAutofit/>
+          </a:bodyPr>
+          <a:lstStyle/>
+          <a:p>
+            <a:pPr marL="0" lvl="0" indent="0" algn="l" rtl="0">
+              <a:spcBef>
+                <a:spcPts val="0"/>
+              </a:spcBef>
+              <a:spcAft>
+                <a:spcPts val="0"/>
+              </a:spcAft>
+              <a:buNone/>
+            </a:pPr>
+            <a:endParaRPr/>
+          </a:p>
+        </p:txBody>
+      </p:sp>
+    </p:spTree>
+    <p:extLst>
+      <p:ext uri="{BB962C8B-B14F-4D97-AF65-F5344CB8AC3E}">
+        <p14:creationId xmlns:p14="http://schemas.microsoft.com/office/powerpoint/2010/main" val="2855338899"/>
+      </p:ext>
+    </p:extLst>
+  </p:cSld>
+  <p:clrMapOvr>
+    <a:masterClrMapping/>
+  </p:clrMapOvr>
+</p:notes>
+</file>
+
+<file path=ppt/notesSlides/notesSlide4.xml><?xml version="1.0" encoding="utf-8"?>
+<p:notes xmlns:a="http://schemas.openxmlformats.org/drawingml/2006/main" xmlns:r="http://schemas.openxmlformats.org/officeDocument/2006/relationships" xmlns:p="http://schemas.openxmlformats.org/presentationml/2006/main" showMasterSp="0" showMasterPhAnim="0">
+  <p:cSld>
+    <p:spTree>
+      <p:nvGrpSpPr>
+        <p:cNvPr id="1" name="Shape 57"/>
+        <p:cNvGrpSpPr/>
+        <p:nvPr/>
+      </p:nvGrpSpPr>
+      <p:grpSpPr>
+        <a:xfrm>
+          <a:off x="0" y="0"/>
+          <a:ext cx="0" cy="0"/>
+          <a:chOff x="0" y="0"/>
+          <a:chExt cx="0" cy="0"/>
+        </a:xfrm>
+      </p:grpSpPr>
+      <p:sp>
+        <p:nvSpPr>
+          <p:cNvPr id="58" name="Google Shape;58;gf035d46749_0_0:notes"/>
+          <p:cNvSpPr>
+            <a:spLocks noGrp="1" noRot="1" noChangeAspect="1"/>
+          </p:cNvSpPr>
+          <p:nvPr>
+            <p:ph type="sldImg" idx="2"/>
+          </p:nvPr>
+        </p:nvSpPr>
+        <p:spPr>
+          <a:xfrm>
+            <a:off x="381000" y="685800"/>
+            <a:ext cx="6096000" cy="3429000"/>
+          </a:xfrm>
+          <a:custGeom>
+            <a:avLst/>
+            <a:gdLst/>
+            <a:ahLst/>
+            <a:cxnLst/>
+            <a:rect l="l" t="t" r="r" b="b"/>
+            <a:pathLst>
+              <a:path w="120000" h="120000" extrusionOk="0">
+                <a:moveTo>
+                  <a:pt x="0" y="0"/>
+                </a:moveTo>
+                <a:lnTo>
+                  <a:pt x="120000" y="0"/>
+                </a:lnTo>
+                <a:lnTo>
+                  <a:pt x="120000" y="120000"/>
+                </a:lnTo>
+                <a:lnTo>
+                  <a:pt x="0" y="120000"/>
+                </a:lnTo>
+                <a:close/>
+              </a:path>
+            </a:pathLst>
+          </a:custGeom>
+        </p:spPr>
+      </p:sp>
+      <p:sp>
+        <p:nvSpPr>
+          <p:cNvPr id="59" name="Google Shape;59;gf035d46749_0_0:notes"/>
+          <p:cNvSpPr txBox="1">
+            <a:spLocks noGrp="1"/>
+          </p:cNvSpPr>
+          <p:nvPr>
+            <p:ph type="body" idx="1"/>
+          </p:nvPr>
+        </p:nvSpPr>
+        <p:spPr>
+          <a:xfrm>
+            <a:off x="685800" y="4343400"/>
+            <a:ext cx="5486400" cy="4114800"/>
+          </a:xfrm>
+          <a:prstGeom prst="rect">
+            <a:avLst/>
+          </a:prstGeom>
+        </p:spPr>
+        <p:txBody>
+          <a:bodyPr spcFirstLastPara="1" wrap="square" lIns="91425" tIns="91425" rIns="91425" bIns="91425" anchor="t" anchorCtr="0">
+            <a:noAutofit/>
+          </a:bodyPr>
+          <a:lstStyle/>
+          <a:p>
+            <a:pPr marL="0" lvl="0" indent="0" algn="l" rtl="0">
+              <a:spcBef>
+                <a:spcPts val="0"/>
+              </a:spcBef>
+              <a:spcAft>
+                <a:spcPts val="0"/>
+              </a:spcAft>
+              <a:buNone/>
+            </a:pPr>
+            <a:endParaRPr/>
+          </a:p>
+        </p:txBody>
+      </p:sp>
+    </p:spTree>
+    <p:extLst>
+      <p:ext uri="{BB962C8B-B14F-4D97-AF65-F5344CB8AC3E}">
+        <p14:creationId xmlns:p14="http://schemas.microsoft.com/office/powerpoint/2010/main" val="2936953240"/>
+      </p:ext>
+    </p:extLst>
+  </p:cSld>
+  <p:clrMapOvr>
+    <a:masterClrMapping/>
+  </p:clrMapOvr>
+</p:notes>
+</file>
+
+<file path=ppt/notesSlides/notesSlide5.xml><?xml version="1.0" encoding="utf-8"?>
+<p:notes xmlns:a="http://schemas.openxmlformats.org/drawingml/2006/main" xmlns:r="http://schemas.openxmlformats.org/officeDocument/2006/relationships" xmlns:p="http://schemas.openxmlformats.org/presentationml/2006/main" showMasterSp="0" showMasterPhAnim="0">
+  <p:cSld>
+    <p:spTree>
+      <p:nvGrpSpPr>
+        <p:cNvPr id="1" name="Shape 57"/>
+        <p:cNvGrpSpPr/>
+        <p:nvPr/>
+      </p:nvGrpSpPr>
+      <p:grpSpPr>
+        <a:xfrm>
+          <a:off x="0" y="0"/>
+          <a:ext cx="0" cy="0"/>
+          <a:chOff x="0" y="0"/>
+          <a:chExt cx="0" cy="0"/>
+        </a:xfrm>
+      </p:grpSpPr>
+      <p:sp>
+        <p:nvSpPr>
+          <p:cNvPr id="58" name="Google Shape;58;gf035d46749_0_0:notes"/>
+          <p:cNvSpPr>
+            <a:spLocks noGrp="1" noRot="1" noChangeAspect="1"/>
+          </p:cNvSpPr>
+          <p:nvPr>
+            <p:ph type="sldImg" idx="2"/>
+          </p:nvPr>
+        </p:nvSpPr>
+        <p:spPr>
+          <a:xfrm>
+            <a:off x="381000" y="685800"/>
+            <a:ext cx="6096000" cy="3429000"/>
+          </a:xfrm>
+          <a:custGeom>
+            <a:avLst/>
+            <a:gdLst/>
+            <a:ahLst/>
+            <a:cxnLst/>
+            <a:rect l="l" t="t" r="r" b="b"/>
+            <a:pathLst>
+              <a:path w="120000" h="120000" extrusionOk="0">
+                <a:moveTo>
+                  <a:pt x="0" y="0"/>
+                </a:moveTo>
+                <a:lnTo>
+                  <a:pt x="120000" y="0"/>
+                </a:lnTo>
+                <a:lnTo>
+                  <a:pt x="120000" y="120000"/>
+                </a:lnTo>
+                <a:lnTo>
+                  <a:pt x="0" y="120000"/>
+                </a:lnTo>
+                <a:close/>
+              </a:path>
+            </a:pathLst>
+          </a:custGeom>
+        </p:spPr>
+      </p:sp>
+      <p:sp>
+        <p:nvSpPr>
+          <p:cNvPr id="59" name="Google Shape;59;gf035d46749_0_0:notes"/>
+          <p:cNvSpPr txBox="1">
+            <a:spLocks noGrp="1"/>
+          </p:cNvSpPr>
+          <p:nvPr>
+            <p:ph type="body" idx="1"/>
+          </p:nvPr>
+        </p:nvSpPr>
+        <p:spPr>
+          <a:xfrm>
+            <a:off x="685800" y="4343400"/>
+            <a:ext cx="5486400" cy="4114800"/>
+          </a:xfrm>
+          <a:prstGeom prst="rect">
+            <a:avLst/>
+          </a:prstGeom>
+        </p:spPr>
+        <p:txBody>
+          <a:bodyPr spcFirstLastPara="1" wrap="square" lIns="91425" tIns="91425" rIns="91425" bIns="91425" anchor="t" anchorCtr="0">
+            <a:noAutofit/>
+          </a:bodyPr>
+          <a:lstStyle/>
+          <a:p>
+            <a:pPr marL="0" lvl="0" indent="0" algn="l" rtl="0">
+              <a:spcBef>
+                <a:spcPts val="0"/>
+              </a:spcBef>
+              <a:spcAft>
+                <a:spcPts val="0"/>
+              </a:spcAft>
+              <a:buNone/>
+            </a:pPr>
+            <a:endParaRPr/>
+          </a:p>
+        </p:txBody>
+      </p:sp>
+    </p:spTree>
+    <p:extLst>
+      <p:ext uri="{BB962C8B-B14F-4D97-AF65-F5344CB8AC3E}">
+        <p14:creationId xmlns:p14="http://schemas.microsoft.com/office/powerpoint/2010/main" val="1646217499"/>
+      </p:ext>
+    </p:extLst>
+  </p:cSld>
+  <p:clrMapOvr>
+    <a:masterClrMapping/>
+  </p:clrMapOvr>
+</p:notes>
+</file>
+
+<file path=ppt/notesSlides/notesSlide6.xml><?xml version="1.0" encoding="utf-8"?>
+<p:notes xmlns:a="http://schemas.openxmlformats.org/drawingml/2006/main" xmlns:r="http://schemas.openxmlformats.org/officeDocument/2006/relationships" xmlns:p="http://schemas.openxmlformats.org/presentationml/2006/main" showMasterSp="0" showMasterPhAnim="0">
+  <p:cSld>
+    <p:spTree>
+      <p:nvGrpSpPr>
+        <p:cNvPr id="1" name="Shape 57"/>
+        <p:cNvGrpSpPr/>
+        <p:nvPr/>
+      </p:nvGrpSpPr>
+      <p:grpSpPr>
+        <a:xfrm>
+          <a:off x="0" y="0"/>
+          <a:ext cx="0" cy="0"/>
+          <a:chOff x="0" y="0"/>
+          <a:chExt cx="0" cy="0"/>
+        </a:xfrm>
+      </p:grpSpPr>
+      <p:sp>
+        <p:nvSpPr>
+          <p:cNvPr id="58" name="Google Shape;58;gf035d46749_0_0:notes"/>
+          <p:cNvSpPr>
+            <a:spLocks noGrp="1" noRot="1" noChangeAspect="1"/>
+          </p:cNvSpPr>
+          <p:nvPr>
+            <p:ph type="sldImg" idx="2"/>
+          </p:nvPr>
+        </p:nvSpPr>
+        <p:spPr>
+          <a:xfrm>
+            <a:off x="381000" y="685800"/>
+            <a:ext cx="6096000" cy="3429000"/>
+          </a:xfrm>
+          <a:custGeom>
+            <a:avLst/>
+            <a:gdLst/>
+            <a:ahLst/>
+            <a:cxnLst/>
+            <a:rect l="l" t="t" r="r" b="b"/>
+            <a:pathLst>
+              <a:path w="120000" h="120000" extrusionOk="0">
+                <a:moveTo>
+                  <a:pt x="0" y="0"/>
+                </a:moveTo>
+                <a:lnTo>
+                  <a:pt x="120000" y="0"/>
+                </a:lnTo>
+                <a:lnTo>
+                  <a:pt x="120000" y="120000"/>
+                </a:lnTo>
+                <a:lnTo>
+                  <a:pt x="0" y="120000"/>
+                </a:lnTo>
+                <a:close/>
+              </a:path>
+            </a:pathLst>
+          </a:custGeom>
+        </p:spPr>
+      </p:sp>
+      <p:sp>
+        <p:nvSpPr>
+          <p:cNvPr id="59" name="Google Shape;59;gf035d46749_0_0:notes"/>
+          <p:cNvSpPr txBox="1">
+            <a:spLocks noGrp="1"/>
+          </p:cNvSpPr>
+          <p:nvPr>
+            <p:ph type="body" idx="1"/>
+          </p:nvPr>
+        </p:nvSpPr>
+        <p:spPr>
+          <a:xfrm>
+            <a:off x="685800" y="4343400"/>
+            <a:ext cx="5486400" cy="4114800"/>
+          </a:xfrm>
+          <a:prstGeom prst="rect">
+            <a:avLst/>
+          </a:prstGeom>
+        </p:spPr>
+        <p:txBody>
+          <a:bodyPr spcFirstLastPara="1" wrap="square" lIns="91425" tIns="91425" rIns="91425" bIns="91425" anchor="t" anchorCtr="0">
+            <a:noAutofit/>
+          </a:bodyPr>
+          <a:lstStyle/>
+          <a:p>
+            <a:pPr marL="0" lvl="0" indent="0" algn="l" rtl="0">
+              <a:spcBef>
+                <a:spcPts val="0"/>
+              </a:spcBef>
+              <a:spcAft>
+                <a:spcPts val="0"/>
+              </a:spcAft>
+              <a:buNone/>
+            </a:pPr>
+            <a:endParaRPr/>
+          </a:p>
+        </p:txBody>
+      </p:sp>
+    </p:spTree>
+    <p:extLst>
+      <p:ext uri="{BB962C8B-B14F-4D97-AF65-F5344CB8AC3E}">
+        <p14:creationId xmlns:p14="http://schemas.microsoft.com/office/powerpoint/2010/main" val="540172468"/>
+      </p:ext>
+    </p:extLst>
+  </p:cSld>
+  <p:clrMapOvr>
+    <a:masterClrMapping/>
+  </p:clrMapOvr>
+</p:notes>
+</file>
+
+<file path=ppt/notesSlides/notesSlide7.xml><?xml version="1.0" encoding="utf-8"?>
+<p:notes xmlns:a="http://schemas.openxmlformats.org/drawingml/2006/main" xmlns:r="http://schemas.openxmlformats.org/officeDocument/2006/relationships" xmlns:p="http://schemas.openxmlformats.org/presentationml/2006/main" showMasterSp="0" showMasterPhAnim="0">
+  <p:cSld>
+    <p:spTree>
+      <p:nvGrpSpPr>
+        <p:cNvPr id="1" name="Shape 57"/>
+        <p:cNvGrpSpPr/>
+        <p:nvPr/>
+      </p:nvGrpSpPr>
+      <p:grpSpPr>
+        <a:xfrm>
+          <a:off x="0" y="0"/>
+          <a:ext cx="0" cy="0"/>
+          <a:chOff x="0" y="0"/>
+          <a:chExt cx="0" cy="0"/>
+        </a:xfrm>
+      </p:grpSpPr>
+      <p:sp>
+        <p:nvSpPr>
+          <p:cNvPr id="58" name="Google Shape;58;gf035d46749_0_0:notes"/>
+          <p:cNvSpPr>
+            <a:spLocks noGrp="1" noRot="1" noChangeAspect="1"/>
+          </p:cNvSpPr>
+          <p:nvPr>
+            <p:ph type="sldImg" idx="2"/>
+          </p:nvPr>
+        </p:nvSpPr>
+        <p:spPr>
+          <a:xfrm>
+            <a:off x="381000" y="685800"/>
+            <a:ext cx="6096000" cy="3429000"/>
+          </a:xfrm>
+          <a:custGeom>
+            <a:avLst/>
+            <a:gdLst/>
+            <a:ahLst/>
+            <a:cxnLst/>
+            <a:rect l="l" t="t" r="r" b="b"/>
+            <a:pathLst>
+              <a:path w="120000" h="120000" extrusionOk="0">
+                <a:moveTo>
+                  <a:pt x="0" y="0"/>
+                </a:moveTo>
+                <a:lnTo>
+                  <a:pt x="120000" y="0"/>
+                </a:lnTo>
+                <a:lnTo>
+                  <a:pt x="120000" y="120000"/>
+                </a:lnTo>
+                <a:lnTo>
+                  <a:pt x="0" y="120000"/>
+                </a:lnTo>
+                <a:close/>
+              </a:path>
+            </a:pathLst>
+          </a:custGeom>
+        </p:spPr>
+      </p:sp>
+      <p:sp>
+        <p:nvSpPr>
+          <p:cNvPr id="59" name="Google Shape;59;gf035d46749_0_0:notes"/>
+          <p:cNvSpPr txBox="1">
+            <a:spLocks noGrp="1"/>
+          </p:cNvSpPr>
+          <p:nvPr>
+            <p:ph type="body" idx="1"/>
+          </p:nvPr>
+        </p:nvSpPr>
+        <p:spPr>
+          <a:xfrm>
+            <a:off x="685800" y="4343400"/>
+            <a:ext cx="5486400" cy="4114800"/>
+          </a:xfrm>
+          <a:prstGeom prst="rect">
+            <a:avLst/>
+          </a:prstGeom>
+        </p:spPr>
+        <p:txBody>
+          <a:bodyPr spcFirstLastPara="1" wrap="square" lIns="91425" tIns="91425" rIns="91425" bIns="91425" anchor="t" anchorCtr="0">
+            <a:noAutofit/>
+          </a:bodyPr>
+          <a:lstStyle/>
+          <a:p>
+            <a:pPr marL="0" lvl="0" indent="0" algn="l" rtl="0">
+              <a:spcBef>
+                <a:spcPts val="0"/>
+              </a:spcBef>
+              <a:spcAft>
+                <a:spcPts val="0"/>
+              </a:spcAft>
+              <a:buNone/>
+            </a:pPr>
+            <a:endParaRPr/>
+          </a:p>
+        </p:txBody>
+      </p:sp>
+    </p:spTree>
+    <p:extLst>
+      <p:ext uri="{BB962C8B-B14F-4D97-AF65-F5344CB8AC3E}">
+        <p14:creationId xmlns:p14="http://schemas.microsoft.com/office/powerpoint/2010/main" val="271590997"/>
+      </p:ext>
+    </p:extLst>
+  </p:cSld>
+  <p:clrMapOvr>
+    <a:masterClrMapping/>
+  </p:clrMapOvr>
+</p:notes>
+</file>
+
 <file path=ppt/slideLayouts/slideLayout1.xml><?xml version="1.0" encoding="utf-8"?>
 <p:sldLayout xmlns:a="http://schemas.openxmlformats.org/drawingml/2006/main" xmlns:r="http://schemas.openxmlformats.org/officeDocument/2006/relationships" xmlns:p="http://schemas.openxmlformats.org/presentationml/2006/main" type="title" preserve="1">
   <p:cSld name="Title Slide">
@@ -1689,6 +2242,204 @@
 </p:sldLayout>
 </file>
 
+<file path=ppt/slideLayouts/slideLayout13.xml><?xml version="1.0" encoding="utf-8"?>
+<p:sldLayout xmlns:a="http://schemas.openxmlformats.org/drawingml/2006/main" xmlns:r="http://schemas.openxmlformats.org/officeDocument/2006/relationships" xmlns:p="http://schemas.openxmlformats.org/presentationml/2006/main" userDrawn="1">
+  <p:cSld name="標題及內容">
+    <p:spTree>
+      <p:nvGrpSpPr>
+        <p:cNvPr id="1" name=""/>
+        <p:cNvGrpSpPr/>
+        <p:nvPr/>
+      </p:nvGrpSpPr>
+      <p:grpSpPr>
+        <a:xfrm>
+          <a:off x="0" y="0"/>
+          <a:ext cx="0" cy="0"/>
+          <a:chOff x="0" y="0"/>
+          <a:chExt cx="0" cy="0"/>
+        </a:xfrm>
+      </p:grpSpPr>
+      <p:sp>
+        <p:nvSpPr>
+          <p:cNvPr id="8" name="Text Placeholder 10">
+            <a:extLst>
+              <a:ext uri="{FF2B5EF4-FFF2-40B4-BE49-F238E27FC236}">
+                <a16:creationId xmlns:a16="http://schemas.microsoft.com/office/drawing/2014/main" id="{CF770468-7825-1D46-9342-3E954F71C50A}"/>
+              </a:ext>
+            </a:extLst>
+          </p:cNvPr>
+          <p:cNvSpPr>
+            <a:spLocks noGrp="1"/>
+          </p:cNvSpPr>
+          <p:nvPr>
+            <p:ph type="body" sz="quarter" idx="13"/>
+          </p:nvPr>
+        </p:nvSpPr>
+        <p:spPr>
+          <a:xfrm>
+            <a:off x="501962" y="586653"/>
+            <a:ext cx="11188700" cy="825587"/>
+          </a:xfrm>
+        </p:spPr>
+        <p:txBody>
+          <a:bodyPr>
+            <a:noAutofit/>
+          </a:bodyPr>
+          <a:lstStyle>
+            <a:lvl1pPr marL="0" indent="0" algn="ctr">
+              <a:buNone/>
+              <a:defRPr sz="4000">
+                <a:solidFill>
+                  <a:schemeClr val="tx1"/>
+                </a:solidFill>
+                <a:latin typeface="+mn-lt"/>
+              </a:defRPr>
+            </a:lvl1pPr>
+          </a:lstStyle>
+          <a:p>
+            <a:pPr lvl="0"/>
+            <a:r>
+              <a:rPr lang="en-US" dirty="0"/>
+              <a:t>Click to edit Master text styles</a:t>
+            </a:r>
+          </a:p>
+        </p:txBody>
+      </p:sp>
+      <p:sp>
+        <p:nvSpPr>
+          <p:cNvPr id="9" name="Content Placeholder 2">
+            <a:extLst>
+              <a:ext uri="{FF2B5EF4-FFF2-40B4-BE49-F238E27FC236}">
+                <a16:creationId xmlns:a16="http://schemas.microsoft.com/office/drawing/2014/main" id="{40F33BFA-6000-AE4B-9D1F-B606C3C5BB42}"/>
+              </a:ext>
+            </a:extLst>
+          </p:cNvPr>
+          <p:cNvSpPr>
+            <a:spLocks noGrp="1"/>
+          </p:cNvSpPr>
+          <p:nvPr>
+            <p:ph idx="1"/>
+          </p:nvPr>
+        </p:nvSpPr>
+        <p:spPr>
+          <a:xfrm>
+            <a:off x="501962" y="1604963"/>
+            <a:ext cx="11187115" cy="4153041"/>
+          </a:xfrm>
+        </p:spPr>
+        <p:txBody>
+          <a:bodyPr/>
+          <a:lstStyle>
+            <a:lvl1pPr marL="0" indent="0">
+              <a:spcBef>
+                <a:spcPts val="0"/>
+              </a:spcBef>
+              <a:spcAft>
+                <a:spcPts val="600"/>
+              </a:spcAft>
+              <a:buFont typeface="+mj-lt"/>
+              <a:buNone/>
+              <a:defRPr sz="1600">
+                <a:solidFill>
+                  <a:schemeClr val="accent1"/>
+                </a:solidFill>
+              </a:defRPr>
+            </a:lvl1pPr>
+            <a:lvl2pPr marL="515938" indent="-457200">
+              <a:spcBef>
+                <a:spcPts val="300"/>
+              </a:spcBef>
+              <a:spcAft>
+                <a:spcPts val="600"/>
+              </a:spcAft>
+              <a:buFont typeface="Arial" panose="020B0604020202020204" pitchFamily="34" charset="0"/>
+              <a:buChar char="•"/>
+              <a:defRPr sz="3200">
+                <a:solidFill>
+                  <a:schemeClr val="tx1"/>
+                </a:solidFill>
+              </a:defRPr>
+            </a:lvl2pPr>
+            <a:lvl3pPr marL="514350" indent="-228600">
+              <a:spcBef>
+                <a:spcPts val="300"/>
+              </a:spcBef>
+              <a:spcAft>
+                <a:spcPts val="600"/>
+              </a:spcAft>
+              <a:buClr>
+                <a:schemeClr val="accent1"/>
+              </a:buClr>
+              <a:buFont typeface="Arial" panose="020B0604020202020204" pitchFamily="34" charset="0"/>
+              <a:buChar char="•"/>
+              <a:defRPr>
+                <a:solidFill>
+                  <a:schemeClr val="bg2">
+                    <a:lumMod val="75000"/>
+                  </a:schemeClr>
+                </a:solidFill>
+              </a:defRPr>
+            </a:lvl3pPr>
+            <a:lvl4pPr marL="739775" indent="-228600">
+              <a:spcBef>
+                <a:spcPts val="300"/>
+              </a:spcBef>
+              <a:spcAft>
+                <a:spcPts val="600"/>
+              </a:spcAft>
+              <a:buClr>
+                <a:schemeClr val="accent1"/>
+              </a:buClr>
+              <a:buFont typeface="Arial" panose="020B0604020202020204" pitchFamily="34" charset="0"/>
+              <a:buChar char="•"/>
+              <a:defRPr>
+                <a:solidFill>
+                  <a:schemeClr val="bg2">
+                    <a:lumMod val="75000"/>
+                  </a:schemeClr>
+                </a:solidFill>
+              </a:defRPr>
+            </a:lvl4pPr>
+            <a:lvl5pPr marL="974725" indent="-228600">
+              <a:spcBef>
+                <a:spcPts val="300"/>
+              </a:spcBef>
+              <a:spcAft>
+                <a:spcPts val="600"/>
+              </a:spcAft>
+              <a:buClr>
+                <a:schemeClr val="accent1"/>
+              </a:buClr>
+              <a:buFont typeface="Arial" panose="020B0604020202020204" pitchFamily="34" charset="0"/>
+              <a:buChar char="•"/>
+              <a:defRPr>
+                <a:solidFill>
+                  <a:schemeClr val="bg2">
+                    <a:lumMod val="75000"/>
+                  </a:schemeClr>
+                </a:solidFill>
+              </a:defRPr>
+            </a:lvl5pPr>
+          </a:lstStyle>
+          <a:p>
+            <a:pPr lvl="1"/>
+            <a:endParaRPr lang="en-US" dirty="0"/>
+          </a:p>
+        </p:txBody>
+      </p:sp>
+    </p:spTree>
+    <p:extLst>
+      <p:ext uri="{BB962C8B-B14F-4D97-AF65-F5344CB8AC3E}">
+        <p14:creationId xmlns:p14="http://schemas.microsoft.com/office/powerpoint/2010/main" val="2373848473"/>
+      </p:ext>
+    </p:extLst>
+  </p:cSld>
+  <p:clrMapOvr>
+    <a:masterClrMapping/>
+  </p:clrMapOvr>
+</p:sldLayout>
+</file>
+
 <file path=ppt/slideLayouts/slideLayout2.xml><?xml version="1.0" encoding="utf-8"?>
 <p:sldLayout xmlns:a="http://schemas.openxmlformats.org/drawingml/2006/main" xmlns:r="http://schemas.openxmlformats.org/officeDocument/2006/relationships" xmlns:p="http://schemas.openxmlformats.org/presentationml/2006/main" type="obj" preserve="1">
   <p:cSld name="Title and Content">
@@ -3992,6 +4743,7 @@
     <p:sldLayoutId id="2147483658" r:id="rId10"/>
     <p:sldLayoutId id="2147483659" r:id="rId11"/>
     <p:sldLayoutId id="2147483660" r:id="rId12"/>
+    <p:sldLayoutId id="2147483661" r:id="rId13"/>
   </p:sldLayoutIdLst>
   <p:txStyles>
     <p:titleStyle>
@@ -4934,6 +5686,1957 @@
     <p:extLst>
       <p:ext uri="{BB962C8B-B14F-4D97-AF65-F5344CB8AC3E}">
         <p14:creationId xmlns:p14="http://schemas.microsoft.com/office/powerpoint/2010/main" val="1276252689"/>
+      </p:ext>
+    </p:extLst>
+  </p:cSld>
+  <p:clrMapOvr>
+    <a:masterClrMapping/>
+  </p:clrMapOvr>
+</p:sld>
+</file>
+
+<file path=ppt/slides/slide10.xml><?xml version="1.0" encoding="utf-8"?>
+<p:sld xmlns:a="http://schemas.openxmlformats.org/drawingml/2006/main" xmlns:r="http://schemas.openxmlformats.org/officeDocument/2006/relationships" xmlns:p="http://schemas.openxmlformats.org/presentationml/2006/main" show="0">
+  <p:cSld>
+    <p:spTree>
+      <p:nvGrpSpPr>
+        <p:cNvPr id="1" name="Shape 60"/>
+        <p:cNvGrpSpPr/>
+        <p:nvPr/>
+      </p:nvGrpSpPr>
+      <p:grpSpPr>
+        <a:xfrm>
+          <a:off x="0" y="0"/>
+          <a:ext cx="0" cy="0"/>
+          <a:chOff x="0" y="0"/>
+          <a:chExt cx="0" cy="0"/>
+        </a:xfrm>
+      </p:grpSpPr>
+      <p:sp>
+        <p:nvSpPr>
+          <p:cNvPr id="2" name="Rectangle 1">
+            <a:extLst>
+              <a:ext uri="{FF2B5EF4-FFF2-40B4-BE49-F238E27FC236}">
+                <a16:creationId xmlns:a16="http://schemas.microsoft.com/office/drawing/2014/main" id="{074BF893-61FD-03FF-AEE1-1F7BE0843268}"/>
+              </a:ext>
+            </a:extLst>
+          </p:cNvPr>
+          <p:cNvSpPr/>
+          <p:nvPr/>
+        </p:nvSpPr>
+        <p:spPr>
+          <a:xfrm>
+            <a:off x="1768918" y="1692173"/>
+            <a:ext cx="5500755" cy="3771099"/>
+          </a:xfrm>
+          <a:prstGeom prst="rect">
+            <a:avLst/>
+          </a:prstGeom>
+          <a:solidFill>
+            <a:schemeClr val="bg2"/>
+          </a:solidFill>
+          <a:ln>
+            <a:noFill/>
+          </a:ln>
+        </p:spPr>
+        <p:style>
+          <a:lnRef idx="2">
+            <a:schemeClr val="accent1">
+              <a:shade val="50000"/>
+            </a:schemeClr>
+          </a:lnRef>
+          <a:fillRef idx="1">
+            <a:schemeClr val="accent1"/>
+          </a:fillRef>
+          <a:effectRef idx="0">
+            <a:schemeClr val="accent1"/>
+          </a:effectRef>
+          <a:fontRef idx="minor">
+            <a:schemeClr val="lt1"/>
+          </a:fontRef>
+        </p:style>
+        <p:txBody>
+          <a:bodyPr rtlCol="0" anchor="ctr"/>
+          <a:lstStyle/>
+          <a:p>
+            <a:pPr algn="just">
+              <a:defRPr/>
+            </a:pPr>
+            <a:r>
+              <a:rPr lang="en-US" sz="1200" dirty="0">
+                <a:solidFill>
+                  <a:prstClr val="black"/>
+                </a:solidFill>
+                <a:latin typeface="Calibri" panose="020F0502020204030204"/>
+              </a:rPr>
+              <a:t>What is the stance of the tweet below with respect to COVID-19 vaccine?</a:t>
+            </a:r>
+            <a:r>
+              <a:rPr lang="en-US" sz="1400" dirty="0">
+                <a:solidFill>
+                  <a:prstClr val="black"/>
+                </a:solidFill>
+                <a:latin typeface="Calibri" panose="020F0502020204030204"/>
+              </a:rPr>
+              <a:t> </a:t>
+            </a:r>
+            <a:r>
+              <a:rPr lang="en-US" sz="2000" dirty="0">
+                <a:solidFill>
+                  <a:prstClr val="black"/>
+                </a:solidFill>
+                <a:highlight>
+                  <a:srgbClr val="C0C0C0"/>
+                </a:highlight>
+                <a:latin typeface="Calibri" panose="020F0502020204030204"/>
+              </a:rPr>
+              <a:t>If the tweet is in-favor of COVID-19 vaccine, please label it as "in-favor". If the tweet is against COVID-19 vaccine, please label is as "against". </a:t>
+            </a:r>
+            <a:r>
+              <a:rPr lang="en-US" sz="2000" dirty="0">
+                <a:solidFill>
+                  <a:schemeClr val="tx1"/>
+                </a:solidFill>
+                <a:highlight>
+                  <a:srgbClr val="C0C0C0"/>
+                </a:highlight>
+                <a:latin typeface="Calibri" panose="020F0502020204030204"/>
+              </a:rPr>
+              <a:t>If the tweet is </a:t>
+            </a:r>
+            <a:r>
+              <a:rPr lang="en-US" sz="2000" dirty="0">
+                <a:solidFill>
+                  <a:srgbClr val="C00000"/>
+                </a:solidFill>
+                <a:highlight>
+                  <a:srgbClr val="C0C0C0"/>
+                </a:highlight>
+                <a:latin typeface="Calibri" panose="020F0502020204030204"/>
+              </a:rPr>
+              <a:t>neutral</a:t>
+            </a:r>
+            <a:r>
+              <a:rPr lang="en-US" sz="2000" dirty="0">
+                <a:solidFill>
+                  <a:schemeClr val="tx1"/>
+                </a:solidFill>
+                <a:highlight>
+                  <a:srgbClr val="C0C0C0"/>
+                </a:highlight>
+                <a:latin typeface="Calibri" panose="020F0502020204030204"/>
+              </a:rPr>
+              <a:t> to COVID-19 vaccine, please label it as "neutral-or-unclear". If the stance of the tweet is </a:t>
+            </a:r>
+            <a:r>
+              <a:rPr lang="en-US" sz="2000" dirty="0">
+                <a:solidFill>
+                  <a:srgbClr val="C00000"/>
+                </a:solidFill>
+                <a:highlight>
+                  <a:srgbClr val="C0C0C0"/>
+                </a:highlight>
+                <a:latin typeface="Calibri" panose="020F0502020204030204"/>
+              </a:rPr>
+              <a:t>not clear</a:t>
+            </a:r>
+            <a:r>
+              <a:rPr lang="en-US" sz="2000" dirty="0">
+                <a:solidFill>
+                  <a:schemeClr val="tx1"/>
+                </a:solidFill>
+                <a:highlight>
+                  <a:srgbClr val="C0C0C0"/>
+                </a:highlight>
+                <a:latin typeface="Calibri" panose="020F0502020204030204"/>
+              </a:rPr>
+              <a:t>, please also label it as "neutral-or-unclear". If the tweet is </a:t>
+            </a:r>
+            <a:r>
+              <a:rPr lang="en-US" sz="2000" dirty="0">
+                <a:solidFill>
+                  <a:srgbClr val="C00000"/>
+                </a:solidFill>
+                <a:highlight>
+                  <a:srgbClr val="C0C0C0"/>
+                </a:highlight>
+                <a:latin typeface="Calibri" panose="020F0502020204030204"/>
+              </a:rPr>
+              <a:t>sarcastic</a:t>
+            </a:r>
+            <a:r>
+              <a:rPr lang="en-US" sz="2000" dirty="0">
+                <a:solidFill>
+                  <a:schemeClr val="tx1"/>
+                </a:solidFill>
+                <a:highlight>
+                  <a:srgbClr val="C0C0C0"/>
+                </a:highlight>
+                <a:latin typeface="Calibri" panose="020F0502020204030204"/>
+              </a:rPr>
+              <a:t> and is difficult to infer the true stance, please also label is as "neutral-or-unclear".</a:t>
+            </a:r>
+            <a:r>
+              <a:rPr lang="en-US" sz="2000" dirty="0">
+                <a:solidFill>
+                  <a:schemeClr val="tx1"/>
+                </a:solidFill>
+                <a:latin typeface="Calibri" panose="020F0502020204030204"/>
+              </a:rPr>
+              <a:t> </a:t>
+            </a:r>
+            <a:r>
+              <a:rPr lang="en-US" sz="1200" dirty="0">
+                <a:solidFill>
+                  <a:prstClr val="black"/>
+                </a:solidFill>
+                <a:latin typeface="Calibri" panose="020F0502020204030204"/>
+              </a:rPr>
+              <a:t>Please use exactly one word from the following 3 categories to label it: "in-favor", "against", </a:t>
+            </a:r>
+            <a:r>
+              <a:rPr lang="en-US" sz="2000" dirty="0">
+                <a:solidFill>
+                  <a:srgbClr val="C00000"/>
+                </a:solidFill>
+                <a:highlight>
+                  <a:srgbClr val="C0C0C0"/>
+                </a:highlight>
+                <a:latin typeface="Calibri" panose="020F0502020204030204"/>
+              </a:rPr>
+              <a:t>"neutral-or-unclear"</a:t>
+            </a:r>
+            <a:r>
+              <a:rPr lang="en-US" sz="1200" dirty="0">
+                <a:solidFill>
+                  <a:prstClr val="black"/>
+                </a:solidFill>
+                <a:latin typeface="Calibri" panose="020F0502020204030204"/>
+              </a:rPr>
+              <a:t>. Here is the tweet. </a:t>
+            </a:r>
+            <a:r>
+              <a:rPr lang="en-US" sz="1200" i="1" dirty="0">
+                <a:solidFill>
+                  <a:schemeClr val="accent5">
+                    <a:lumMod val="75000"/>
+                  </a:schemeClr>
+                </a:solidFill>
+                <a:latin typeface="Calibri" panose="020F0502020204030204"/>
+              </a:rPr>
+              <a:t>"covid clusters among the vaccinated are killing our back-to-normal dreams" </a:t>
+            </a:r>
+            <a:r>
+              <a:rPr lang="en-US" sz="1200" dirty="0">
+                <a:solidFill>
+                  <a:prstClr val="black"/>
+                </a:solidFill>
+                <a:latin typeface="Calibri" panose="020F0502020204030204"/>
+              </a:rPr>
+              <a:t>The stance of the tweet is: </a:t>
+            </a:r>
+          </a:p>
+        </p:txBody>
+      </p:sp>
+    </p:spTree>
+    <p:extLst>
+      <p:ext uri="{BB962C8B-B14F-4D97-AF65-F5344CB8AC3E}">
+        <p14:creationId xmlns:p14="http://schemas.microsoft.com/office/powerpoint/2010/main" val="1514335215"/>
+      </p:ext>
+    </p:extLst>
+  </p:cSld>
+  <p:clrMapOvr>
+    <a:masterClrMapping/>
+  </p:clrMapOvr>
+  <p:timing>
+    <p:tnLst>
+      <p:par>
+        <p:cTn id="1" dur="indefinite" restart="never" nodeType="tmRoot">
+          <p:childTnLst>
+            <p:seq concurrent="1" nextAc="seek">
+              <p:cTn id="2" dur="indefinite" nodeType="mainSeq">
+                <p:childTnLst>
+                  <p:par>
+                    <p:cTn id="3" fill="hold">
+                      <p:stCondLst>
+                        <p:cond delay="indefinite"/>
+                      </p:stCondLst>
+                      <p:childTnLst>
+                        <p:par>
+                          <p:cTn id="4" fill="hold">
+                            <p:stCondLst>
+                              <p:cond delay="0"/>
+                            </p:stCondLst>
+                            <p:childTnLst>
+                              <p:par>
+                                <p:cTn id="5" presetID="1" presetClass="entr" presetSubtype="0" fill="hold" grpId="0" nodeType="clickEffect">
+                                  <p:stCondLst>
+                                    <p:cond delay="0"/>
+                                  </p:stCondLst>
+                                  <p:childTnLst>
+                                    <p:set>
+                                      <p:cBhvr>
+                                        <p:cTn id="6" dur="1" fill="hold">
+                                          <p:stCondLst>
+                                            <p:cond delay="0"/>
+                                          </p:stCondLst>
+                                        </p:cTn>
+                                        <p:tgtEl>
+                                          <p:spTgt spid="2"/>
+                                        </p:tgtEl>
+                                        <p:attrNameLst>
+                                          <p:attrName>style.visibility</p:attrName>
+                                        </p:attrNameLst>
+                                      </p:cBhvr>
+                                      <p:to>
+                                        <p:strVal val="visible"/>
+                                      </p:to>
+                                    </p:set>
+                                  </p:childTnLst>
+                                </p:cTn>
+                              </p:par>
+                            </p:childTnLst>
+                          </p:cTn>
+                        </p:par>
+                      </p:childTnLst>
+                    </p:cTn>
+                  </p:par>
+                </p:childTnLst>
+              </p:cTn>
+              <p:prevCondLst>
+                <p:cond evt="onPrev" delay="0">
+                  <p:tgtEl>
+                    <p:sldTgt/>
+                  </p:tgtEl>
+                </p:cond>
+              </p:prevCondLst>
+              <p:nextCondLst>
+                <p:cond evt="onNext" delay="0">
+                  <p:tgtEl>
+                    <p:sldTgt/>
+                  </p:tgtEl>
+                </p:cond>
+              </p:nextCondLst>
+            </p:seq>
+          </p:childTnLst>
+        </p:cTn>
+      </p:par>
+    </p:tnLst>
+    <p:bldLst>
+      <p:bldP spid="2" grpId="0" animBg="1"/>
+    </p:bldLst>
+  </p:timing>
+</p:sld>
+</file>
+
+<file path=ppt/slides/slide11.xml><?xml version="1.0" encoding="utf-8"?>
+<p:sld xmlns:a="http://schemas.openxmlformats.org/drawingml/2006/main" xmlns:r="http://schemas.openxmlformats.org/officeDocument/2006/relationships" xmlns:p="http://schemas.openxmlformats.org/presentationml/2006/main">
+  <p:cSld>
+    <p:spTree>
+      <p:nvGrpSpPr>
+        <p:cNvPr id="1" name=""/>
+        <p:cNvGrpSpPr/>
+        <p:nvPr/>
+      </p:nvGrpSpPr>
+      <p:grpSpPr>
+        <a:xfrm>
+          <a:off x="0" y="0"/>
+          <a:ext cx="0" cy="0"/>
+          <a:chOff x="0" y="0"/>
+          <a:chExt cx="0" cy="0"/>
+        </a:xfrm>
+      </p:grpSpPr>
+      <p:grpSp>
+        <p:nvGrpSpPr>
+          <p:cNvPr id="19" name="Group 18">
+            <a:extLst>
+              <a:ext uri="{FF2B5EF4-FFF2-40B4-BE49-F238E27FC236}">
+                <a16:creationId xmlns:a16="http://schemas.microsoft.com/office/drawing/2014/main" id="{1E86C06F-31A5-91B8-3D33-F4963709F81F}"/>
+              </a:ext>
+            </a:extLst>
+          </p:cNvPr>
+          <p:cNvGrpSpPr/>
+          <p:nvPr/>
+        </p:nvGrpSpPr>
+        <p:grpSpPr>
+          <a:xfrm>
+            <a:off x="217363" y="297117"/>
+            <a:ext cx="11667265" cy="6444900"/>
+            <a:chOff x="217363" y="297117"/>
+            <a:chExt cx="11667265" cy="6444900"/>
+          </a:xfrm>
+        </p:grpSpPr>
+        <p:sp>
+          <p:nvSpPr>
+            <p:cNvPr id="18" name="Rectangle 17">
+              <a:extLst>
+                <a:ext uri="{FF2B5EF4-FFF2-40B4-BE49-F238E27FC236}">
+                  <a16:creationId xmlns:a16="http://schemas.microsoft.com/office/drawing/2014/main" id="{4A08397E-4234-57DC-1AA1-8BEBE88D69AA}"/>
+                </a:ext>
+              </a:extLst>
+            </p:cNvPr>
+            <p:cNvSpPr/>
+            <p:nvPr/>
+          </p:nvSpPr>
+          <p:spPr>
+            <a:xfrm>
+              <a:off x="217363" y="297117"/>
+              <a:ext cx="11667265" cy="6444900"/>
+            </a:xfrm>
+            <a:prstGeom prst="rect">
+              <a:avLst/>
+            </a:prstGeom>
+            <a:solidFill>
+              <a:schemeClr val="bg1"/>
+            </a:solidFill>
+            <a:ln>
+              <a:noFill/>
+            </a:ln>
+          </p:spPr>
+          <p:style>
+            <a:lnRef idx="2">
+              <a:schemeClr val="accent1">
+                <a:shade val="50000"/>
+              </a:schemeClr>
+            </a:lnRef>
+            <a:fillRef idx="1">
+              <a:schemeClr val="accent1"/>
+            </a:fillRef>
+            <a:effectRef idx="0">
+              <a:schemeClr val="accent1"/>
+            </a:effectRef>
+            <a:fontRef idx="minor">
+              <a:schemeClr val="lt1"/>
+            </a:fontRef>
+          </p:style>
+          <p:txBody>
+            <a:bodyPr rtlCol="0" anchor="ctr"/>
+            <a:lstStyle/>
+            <a:p>
+              <a:pPr algn="ctr"/>
+              <a:endParaRPr lang="en-TW"/>
+            </a:p>
+          </p:txBody>
+        </p:sp>
+        <p:sp>
+          <p:nvSpPr>
+            <p:cNvPr id="8" name="Rectangle 7">
+              <a:extLst>
+                <a:ext uri="{FF2B5EF4-FFF2-40B4-BE49-F238E27FC236}">
+                  <a16:creationId xmlns:a16="http://schemas.microsoft.com/office/drawing/2014/main" id="{F275C616-7F5F-B338-86FF-201E1C155701}"/>
+                </a:ext>
+              </a:extLst>
+            </p:cNvPr>
+            <p:cNvSpPr/>
+            <p:nvPr/>
+          </p:nvSpPr>
+          <p:spPr>
+            <a:xfrm>
+              <a:off x="307371" y="1179576"/>
+              <a:ext cx="5641848" cy="4951413"/>
+            </a:xfrm>
+            <a:prstGeom prst="rect">
+              <a:avLst/>
+            </a:prstGeom>
+            <a:noFill/>
+            <a:ln w="19050">
+              <a:solidFill>
+                <a:schemeClr val="tx1"/>
+              </a:solidFill>
+            </a:ln>
+          </p:spPr>
+          <p:style>
+            <a:lnRef idx="2">
+              <a:schemeClr val="accent1">
+                <a:shade val="50000"/>
+              </a:schemeClr>
+            </a:lnRef>
+            <a:fillRef idx="1">
+              <a:schemeClr val="accent1"/>
+            </a:fillRef>
+            <a:effectRef idx="0">
+              <a:schemeClr val="accent1"/>
+            </a:effectRef>
+            <a:fontRef idx="minor">
+              <a:schemeClr val="lt1"/>
+            </a:fontRef>
+          </p:style>
+          <p:txBody>
+            <a:bodyPr rtlCol="0" anchor="ctr"/>
+            <a:lstStyle/>
+            <a:p>
+              <a:pPr algn="just"/>
+              <a:r>
+                <a:rPr lang="en-US" u="sng" dirty="0">
+                  <a:solidFill>
+                    <a:schemeClr val="accent6">
+                      <a:lumMod val="75000"/>
+                    </a:schemeClr>
+                  </a:solidFill>
+                  <a:latin typeface="Calibri" panose="020F0502020204030204"/>
+                </a:rPr>
+                <a:t>What is the stance of the tweet below with respect to 'Legalization of Abortion'? </a:t>
+              </a:r>
+              <a:r>
+                <a:rPr lang="en-US" dirty="0">
+                  <a:solidFill>
+                    <a:srgbClr val="7030A0"/>
+                  </a:solidFill>
+                </a:rPr>
+                <a:t>If we can infer from the tweet that the tweeter supports 'Legalization of Abortion', please label it as 'in-favor'. If we can infer from the tweet that the tweeter is against 'Legalization of Abortion', please label is as 'against'. If we can infer from the tweet that the tweeter has a neutral stance towards 'Legalization of Abortion', please label it as 'neutral-or-unclear'. If there is no clue in the tweet to reveal the stance of the tweeter towards 'Legalization of Abortion', please also label is as 'neutral-or-unclear'. </a:t>
+              </a:r>
+              <a:r>
+                <a:rPr lang="en-US" dirty="0">
+                  <a:solidFill>
+                    <a:schemeClr val="tx1"/>
+                  </a:solidFill>
+                  <a:latin typeface="Calibri" panose="020F0502020204030204"/>
+                </a:rPr>
+                <a:t>Please use exactly one word from the following 3 categories to label it: </a:t>
+              </a:r>
+              <a:r>
+                <a:rPr lang="en-US" u="sng" dirty="0">
+                  <a:solidFill>
+                    <a:srgbClr val="C00000"/>
+                  </a:solidFill>
+                  <a:latin typeface="Calibri" panose="020F0502020204030204"/>
+                </a:rPr>
+                <a:t>'in-favor', 'against', 'neutral-or-unclear'</a:t>
+              </a:r>
+              <a:r>
+                <a:rPr lang="en-US" dirty="0">
+                  <a:solidFill>
+                    <a:schemeClr val="tx1"/>
+                  </a:solidFill>
+                  <a:latin typeface="Calibri" panose="020F0502020204030204"/>
+                </a:rPr>
+                <a:t>. Here are some examples of tweets. Make sure to classify the last tweet correctly.</a:t>
+              </a:r>
+            </a:p>
+          </p:txBody>
+        </p:sp>
+        <p:sp>
+          <p:nvSpPr>
+            <p:cNvPr id="9" name="Rectangle 8">
+              <a:extLst>
+                <a:ext uri="{FF2B5EF4-FFF2-40B4-BE49-F238E27FC236}">
+                  <a16:creationId xmlns:a16="http://schemas.microsoft.com/office/drawing/2014/main" id="{49E2511B-E15A-5E7D-F1ED-AFDDBBAFA77B}"/>
+                </a:ext>
+              </a:extLst>
+            </p:cNvPr>
+            <p:cNvSpPr/>
+            <p:nvPr/>
+          </p:nvSpPr>
+          <p:spPr>
+            <a:xfrm>
+              <a:off x="6096000" y="1197864"/>
+              <a:ext cx="5641848" cy="4951413"/>
+            </a:xfrm>
+            <a:prstGeom prst="rect">
+              <a:avLst/>
+            </a:prstGeom>
+            <a:noFill/>
+            <a:ln w="19050">
+              <a:solidFill>
+                <a:schemeClr val="tx1"/>
+              </a:solidFill>
+            </a:ln>
+          </p:spPr>
+          <p:style>
+            <a:lnRef idx="2">
+              <a:schemeClr val="accent1">
+                <a:shade val="50000"/>
+              </a:schemeClr>
+            </a:lnRef>
+            <a:fillRef idx="1">
+              <a:schemeClr val="accent1"/>
+            </a:fillRef>
+            <a:effectRef idx="0">
+              <a:schemeClr val="accent1"/>
+            </a:effectRef>
+            <a:fontRef idx="minor">
+              <a:schemeClr val="lt1"/>
+            </a:fontRef>
+          </p:style>
+          <p:txBody>
+            <a:bodyPr rtlCol="0" anchor="ctr"/>
+            <a:lstStyle/>
+            <a:p>
+              <a:pPr algn="just"/>
+              <a:r>
+                <a:rPr lang="en-US" dirty="0">
+                  <a:solidFill>
+                    <a:schemeClr val="tx1"/>
+                  </a:solidFill>
+                  <a:highlight>
+                    <a:srgbClr val="C0C0C0"/>
+                  </a:highlight>
+                  <a:latin typeface="Calibri" panose="020F0502020204030204"/>
+                </a:rPr>
+                <a:t>Q: Tweet: it's a free country. freedom includes freedom of choice. </a:t>
+              </a:r>
+            </a:p>
+            <a:p>
+              <a:pPr algn="just"/>
+              <a:r>
+                <a:rPr lang="en-US" dirty="0">
+                  <a:solidFill>
+                    <a:schemeClr val="tx1"/>
+                  </a:solidFill>
+                  <a:highlight>
+                    <a:srgbClr val="C0C0C0"/>
+                  </a:highlight>
+                  <a:latin typeface="Calibri" panose="020F0502020204030204"/>
+                </a:rPr>
+                <a:t>Is this tweet in-favor, against, or neutral-or-unclear? </a:t>
+              </a:r>
+            </a:p>
+            <a:p>
+              <a:pPr algn="just"/>
+              <a:r>
+                <a:rPr lang="en-US" dirty="0">
+                  <a:solidFill>
+                    <a:schemeClr val="tx1"/>
+                  </a:solidFill>
+                  <a:highlight>
+                    <a:srgbClr val="C0C0C0"/>
+                  </a:highlight>
+                  <a:latin typeface="Calibri" panose="020F0502020204030204"/>
+                </a:rPr>
+                <a:t>A: </a:t>
+              </a:r>
+              <a:r>
+                <a:rPr lang="en-US" u="sng" dirty="0">
+                  <a:solidFill>
+                    <a:srgbClr val="C00000"/>
+                  </a:solidFill>
+                  <a:highlight>
+                    <a:srgbClr val="C0C0C0"/>
+                  </a:highlight>
+                  <a:latin typeface="Calibri" panose="020F0502020204030204"/>
+                </a:rPr>
+                <a:t>in-favor</a:t>
+              </a:r>
+              <a:r>
+                <a:rPr lang="en-US" dirty="0">
+                  <a:solidFill>
+                    <a:schemeClr val="tx1"/>
+                  </a:solidFill>
+                  <a:highlight>
+                    <a:srgbClr val="C0C0C0"/>
+                  </a:highlight>
+                  <a:latin typeface="Calibri" panose="020F0502020204030204"/>
+                </a:rPr>
+                <a:t> </a:t>
+              </a:r>
+            </a:p>
+            <a:p>
+              <a:pPr algn="just"/>
+              <a:r>
+                <a:rPr lang="en-US" dirty="0">
+                  <a:solidFill>
+                    <a:schemeClr val="tx1"/>
+                  </a:solidFill>
+                  <a:highlight>
+                    <a:srgbClr val="C0C0C0"/>
+                  </a:highlight>
+                  <a:latin typeface="Calibri" panose="020F0502020204030204"/>
+                </a:rPr>
+                <a:t>Q: Tweet: </a:t>
+              </a:r>
+              <a:r>
+                <a:rPr lang="en-US" dirty="0" err="1">
+                  <a:solidFill>
+                    <a:schemeClr val="tx1"/>
+                  </a:solidFill>
+                  <a:highlight>
+                    <a:srgbClr val="C0C0C0"/>
+                  </a:highlight>
+                  <a:latin typeface="Calibri" panose="020F0502020204030204"/>
+                </a:rPr>
+                <a:t>i</a:t>
+              </a:r>
+              <a:r>
+                <a:rPr lang="en-US" dirty="0">
+                  <a:solidFill>
+                    <a:schemeClr val="tx1"/>
+                  </a:solidFill>
+                  <a:highlight>
+                    <a:srgbClr val="C0C0C0"/>
+                  </a:highlight>
+                  <a:latin typeface="Calibri" panose="020F0502020204030204"/>
+                </a:rPr>
+                <a:t> really don't understand how some people are pro-choice. a life is a life no matter if it's 2 weeks old or 20 years old. </a:t>
+              </a:r>
+            </a:p>
+            <a:p>
+              <a:pPr algn="just"/>
+              <a:r>
+                <a:rPr lang="en-US" dirty="0">
+                  <a:solidFill>
+                    <a:schemeClr val="tx1"/>
+                  </a:solidFill>
+                  <a:highlight>
+                    <a:srgbClr val="C0C0C0"/>
+                  </a:highlight>
+                  <a:latin typeface="Calibri" panose="020F0502020204030204"/>
+                </a:rPr>
+                <a:t>Is this tweet in-favor, against, or neutral-or-unclear? </a:t>
+              </a:r>
+            </a:p>
+            <a:p>
+              <a:pPr algn="just"/>
+              <a:r>
+                <a:rPr lang="en-US" dirty="0">
+                  <a:solidFill>
+                    <a:schemeClr val="tx1"/>
+                  </a:solidFill>
+                  <a:highlight>
+                    <a:srgbClr val="C0C0C0"/>
+                  </a:highlight>
+                  <a:latin typeface="Calibri" panose="020F0502020204030204"/>
+                </a:rPr>
+                <a:t>A: </a:t>
+              </a:r>
+              <a:r>
+                <a:rPr lang="en-US" u="sng" dirty="0">
+                  <a:solidFill>
+                    <a:srgbClr val="C00000"/>
+                  </a:solidFill>
+                  <a:highlight>
+                    <a:srgbClr val="C0C0C0"/>
+                  </a:highlight>
+                  <a:latin typeface="Calibri" panose="020F0502020204030204"/>
+                </a:rPr>
+                <a:t>against</a:t>
+              </a:r>
+              <a:r>
+                <a:rPr lang="en-US" dirty="0">
+                  <a:solidFill>
+                    <a:schemeClr val="tx1"/>
+                  </a:solidFill>
+                  <a:highlight>
+                    <a:srgbClr val="C0C0C0"/>
+                  </a:highlight>
+                  <a:latin typeface="Calibri" panose="020F0502020204030204"/>
+                </a:rPr>
+                <a:t> </a:t>
+              </a:r>
+            </a:p>
+            <a:p>
+              <a:pPr algn="just"/>
+              <a:r>
+                <a:rPr lang="en-US" dirty="0">
+                  <a:solidFill>
+                    <a:schemeClr val="tx1"/>
+                  </a:solidFill>
+                  <a:highlight>
+                    <a:srgbClr val="C0C0C0"/>
+                  </a:highlight>
+                  <a:latin typeface="Calibri" panose="020F0502020204030204"/>
+                </a:rPr>
+                <a:t>Q: Tweet: so ready for my abortion debate Is this tweet in-favor, against, or neutral-or-unclear? </a:t>
+              </a:r>
+            </a:p>
+            <a:p>
+              <a:pPr algn="just"/>
+              <a:r>
+                <a:rPr lang="en-US" dirty="0">
+                  <a:solidFill>
+                    <a:schemeClr val="tx1"/>
+                  </a:solidFill>
+                  <a:highlight>
+                    <a:srgbClr val="C0C0C0"/>
+                  </a:highlight>
+                  <a:latin typeface="Calibri" panose="020F0502020204030204"/>
+                </a:rPr>
+                <a:t>A: </a:t>
+              </a:r>
+              <a:r>
+                <a:rPr lang="en-US" u="sng" dirty="0">
+                  <a:solidFill>
+                    <a:srgbClr val="C00000"/>
+                  </a:solidFill>
+                  <a:highlight>
+                    <a:srgbClr val="C0C0C0"/>
+                  </a:highlight>
+                  <a:latin typeface="Calibri" panose="020F0502020204030204"/>
+                </a:rPr>
+                <a:t>neutral-or-unclear</a:t>
+              </a:r>
+              <a:r>
+                <a:rPr lang="en-US" dirty="0">
+                  <a:solidFill>
+                    <a:schemeClr val="tx1"/>
+                  </a:solidFill>
+                  <a:highlight>
+                    <a:srgbClr val="C0C0C0"/>
+                  </a:highlight>
+                  <a:latin typeface="Calibri" panose="020F0502020204030204"/>
+                </a:rPr>
+                <a:t> </a:t>
+              </a:r>
+            </a:p>
+            <a:p>
+              <a:pPr algn="just"/>
+              <a:r>
+                <a:rPr lang="en-US" dirty="0">
+                  <a:solidFill>
+                    <a:schemeClr val="tx1"/>
+                  </a:solidFill>
+                  <a:latin typeface="Calibri" panose="020F0502020204030204"/>
+                </a:rPr>
+                <a:t>Q: Tweet: </a:t>
+              </a:r>
+              <a:r>
+                <a:rPr lang="en-US" sz="2000" i="1" dirty="0">
+                  <a:solidFill>
+                    <a:schemeClr val="accent5">
+                      <a:lumMod val="75000"/>
+                    </a:schemeClr>
+                  </a:solidFill>
+                  <a:latin typeface="Calibri" panose="020F0502020204030204"/>
+                </a:rPr>
+                <a:t>“</a:t>
+              </a:r>
+              <a:r>
+                <a:rPr lang="en-US" sz="2000" i="1" dirty="0" err="1">
+                  <a:solidFill>
+                    <a:schemeClr val="accent5">
+                      <a:lumMod val="75000"/>
+                    </a:schemeClr>
+                  </a:solidFill>
+                  <a:latin typeface="Calibri" panose="020F0502020204030204"/>
+                </a:rPr>
+                <a:t>i</a:t>
+              </a:r>
+              <a:r>
+                <a:rPr lang="en-US" sz="2000" i="1" dirty="0">
+                  <a:solidFill>
+                    <a:schemeClr val="accent5">
+                      <a:lumMod val="75000"/>
+                    </a:schemeClr>
+                  </a:solidFill>
+                  <a:latin typeface="Calibri" panose="020F0502020204030204"/>
+                </a:rPr>
+                <a:t> really don't understand how some people are pro-choice. a life is a life no matter if it's 2 weeks old or 20 years old.”</a:t>
+              </a:r>
+              <a:endParaRPr lang="en-US" dirty="0">
+                <a:solidFill>
+                  <a:schemeClr val="tx1"/>
+                </a:solidFill>
+                <a:latin typeface="Calibri" panose="020F0502020204030204"/>
+              </a:endParaRPr>
+            </a:p>
+            <a:p>
+              <a:pPr algn="just"/>
+              <a:r>
+                <a:rPr lang="en-US" dirty="0">
+                  <a:solidFill>
+                    <a:schemeClr val="tx1"/>
+                  </a:solidFill>
+                  <a:latin typeface="Calibri" panose="020F0502020204030204"/>
+                </a:rPr>
+                <a:t>Is this tweet in-favor, against, or neutral-or-unclear? </a:t>
+              </a:r>
+            </a:p>
+            <a:p>
+              <a:pPr algn="just"/>
+              <a:r>
+                <a:rPr lang="en-US" dirty="0">
+                  <a:solidFill>
+                    <a:schemeClr val="tx1"/>
+                  </a:solidFill>
+                  <a:latin typeface="Calibri" panose="020F0502020204030204"/>
+                </a:rPr>
+                <a:t>A:</a:t>
+              </a:r>
+            </a:p>
+          </p:txBody>
+        </p:sp>
+        <p:sp>
+          <p:nvSpPr>
+            <p:cNvPr id="10" name="TextBox 9">
+              <a:extLst>
+                <a:ext uri="{FF2B5EF4-FFF2-40B4-BE49-F238E27FC236}">
+                  <a16:creationId xmlns:a16="http://schemas.microsoft.com/office/drawing/2014/main" id="{D40B326B-5C7D-F138-211E-CB1F8674DA22}"/>
+                </a:ext>
+              </a:extLst>
+            </p:cNvPr>
+            <p:cNvSpPr txBox="1"/>
+            <p:nvPr/>
+          </p:nvSpPr>
+          <p:spPr>
+            <a:xfrm>
+              <a:off x="7801864" y="6341907"/>
+              <a:ext cx="2254981" cy="400110"/>
+            </a:xfrm>
+            <a:prstGeom prst="rect">
+              <a:avLst/>
+            </a:prstGeom>
+            <a:noFill/>
+          </p:spPr>
+          <p:txBody>
+            <a:bodyPr wrap="square" rtlCol="0">
+              <a:spAutoFit/>
+            </a:bodyPr>
+            <a:lstStyle/>
+            <a:p>
+              <a:pPr algn="ctr"/>
+              <a:r>
+                <a:rPr lang="en-TW" sz="2000" dirty="0">
+                  <a:solidFill>
+                    <a:schemeClr val="accent5">
+                      <a:lumMod val="75000"/>
+                    </a:schemeClr>
+                  </a:solidFill>
+                  <a:latin typeface="Calibri" panose="020F0502020204030204"/>
+                </a:rPr>
+                <a:t>Tweet of Interest</a:t>
+              </a:r>
+            </a:p>
+          </p:txBody>
+        </p:sp>
+        <p:cxnSp>
+          <p:nvCxnSpPr>
+            <p:cNvPr id="11" name="Straight Arrow Connector 10">
+              <a:extLst>
+                <a:ext uri="{FF2B5EF4-FFF2-40B4-BE49-F238E27FC236}">
+                  <a16:creationId xmlns:a16="http://schemas.microsoft.com/office/drawing/2014/main" id="{378C0FCE-D2D5-FA09-3F4A-B162E7CF9336}"/>
+                </a:ext>
+              </a:extLst>
+            </p:cNvPr>
+            <p:cNvCxnSpPr>
+              <a:cxnSpLocks/>
+              <a:stCxn id="10" idx="0"/>
+            </p:cNvCxnSpPr>
+            <p:nvPr/>
+          </p:nvCxnSpPr>
+          <p:spPr>
+            <a:xfrm flipV="1">
+              <a:off x="8929355" y="5294376"/>
+              <a:ext cx="0" cy="1047531"/>
+            </a:xfrm>
+            <a:prstGeom prst="straightConnector1">
+              <a:avLst/>
+            </a:prstGeom>
+            <a:ln w="28575">
+              <a:solidFill>
+                <a:schemeClr val="accent5">
+                  <a:lumMod val="75000"/>
+                </a:schemeClr>
+              </a:solidFill>
+              <a:tailEnd type="triangle"/>
+            </a:ln>
+          </p:spPr>
+          <p:style>
+            <a:lnRef idx="1">
+              <a:schemeClr val="accent1"/>
+            </a:lnRef>
+            <a:fillRef idx="0">
+              <a:schemeClr val="accent1"/>
+            </a:fillRef>
+            <a:effectRef idx="0">
+              <a:schemeClr val="accent1"/>
+            </a:effectRef>
+            <a:fontRef idx="minor">
+              <a:schemeClr val="tx1"/>
+            </a:fontRef>
+          </p:style>
+        </p:cxnSp>
+        <p:cxnSp>
+          <p:nvCxnSpPr>
+            <p:cNvPr id="14" name="Straight Arrow Connector 13">
+              <a:extLst>
+                <a:ext uri="{FF2B5EF4-FFF2-40B4-BE49-F238E27FC236}">
+                  <a16:creationId xmlns:a16="http://schemas.microsoft.com/office/drawing/2014/main" id="{95DD30C0-75C9-427A-7434-6FF41FC36729}"/>
+                </a:ext>
+              </a:extLst>
+            </p:cNvPr>
+            <p:cNvCxnSpPr>
+              <a:cxnSpLocks/>
+            </p:cNvCxnSpPr>
+            <p:nvPr/>
+          </p:nvCxnSpPr>
+          <p:spPr>
+            <a:xfrm>
+              <a:off x="8880348" y="996090"/>
+              <a:ext cx="14194" cy="372462"/>
+            </a:xfrm>
+            <a:prstGeom prst="straightConnector1">
+              <a:avLst/>
+            </a:prstGeom>
+            <a:ln w="28575">
+              <a:solidFill>
+                <a:schemeClr val="tx1"/>
+              </a:solidFill>
+              <a:tailEnd type="triangle"/>
+            </a:ln>
+          </p:spPr>
+          <p:style>
+            <a:lnRef idx="1">
+              <a:schemeClr val="accent1"/>
+            </a:lnRef>
+            <a:fillRef idx="0">
+              <a:schemeClr val="accent1"/>
+            </a:fillRef>
+            <a:effectRef idx="0">
+              <a:schemeClr val="accent1"/>
+            </a:effectRef>
+            <a:fontRef idx="minor">
+              <a:schemeClr val="tx1"/>
+            </a:fontRef>
+          </p:style>
+        </p:cxnSp>
+        <p:sp>
+          <p:nvSpPr>
+            <p:cNvPr id="16" name="TextBox 15">
+              <a:extLst>
+                <a:ext uri="{FF2B5EF4-FFF2-40B4-BE49-F238E27FC236}">
+                  <a16:creationId xmlns:a16="http://schemas.microsoft.com/office/drawing/2014/main" id="{23E567EA-A69F-55D1-BEA0-70A7026FB3F1}"/>
+                </a:ext>
+              </a:extLst>
+            </p:cNvPr>
+            <p:cNvSpPr txBox="1"/>
+            <p:nvPr/>
+          </p:nvSpPr>
+          <p:spPr>
+            <a:xfrm>
+              <a:off x="7479798" y="592218"/>
+              <a:ext cx="2656296" cy="400110"/>
+            </a:xfrm>
+            <a:prstGeom prst="rect">
+              <a:avLst/>
+            </a:prstGeom>
+            <a:noFill/>
+          </p:spPr>
+          <p:txBody>
+            <a:bodyPr wrap="square" rtlCol="0">
+              <a:spAutoFit/>
+            </a:bodyPr>
+            <a:lstStyle/>
+            <a:p>
+              <a:pPr algn="ctr"/>
+              <a:r>
+                <a:rPr lang="en-TW" sz="2000" dirty="0">
+                  <a:ln>
+                    <a:solidFill>
+                      <a:sysClr val="windowText" lastClr="000000"/>
+                    </a:solidFill>
+                  </a:ln>
+                  <a:solidFill>
+                    <a:schemeClr val="accent5">
+                      <a:lumMod val="75000"/>
+                    </a:schemeClr>
+                  </a:solidFill>
+                  <a:latin typeface="Calibri" panose="020F0502020204030204"/>
+                </a:rPr>
+                <a:t>Examples (1 per class)</a:t>
+              </a:r>
+            </a:p>
+          </p:txBody>
+        </p:sp>
+      </p:grpSp>
+    </p:spTree>
+    <p:extLst>
+      <p:ext uri="{BB962C8B-B14F-4D97-AF65-F5344CB8AC3E}">
+        <p14:creationId xmlns:p14="http://schemas.microsoft.com/office/powerpoint/2010/main" val="1133861655"/>
+      </p:ext>
+    </p:extLst>
+  </p:cSld>
+  <p:clrMapOvr>
+    <a:masterClrMapping/>
+  </p:clrMapOvr>
+</p:sld>
+</file>
+
+<file path=ppt/slides/slide12.xml><?xml version="1.0" encoding="utf-8"?>
+<p:sld xmlns:a="http://schemas.openxmlformats.org/drawingml/2006/main" xmlns:r="http://schemas.openxmlformats.org/officeDocument/2006/relationships" xmlns:p="http://schemas.openxmlformats.org/presentationml/2006/main">
+  <p:cSld>
+    <p:spTree>
+      <p:nvGrpSpPr>
+        <p:cNvPr id="1" name=""/>
+        <p:cNvGrpSpPr/>
+        <p:nvPr/>
+      </p:nvGrpSpPr>
+      <p:grpSpPr>
+        <a:xfrm>
+          <a:off x="0" y="0"/>
+          <a:ext cx="0" cy="0"/>
+          <a:chOff x="0" y="0"/>
+          <a:chExt cx="0" cy="0"/>
+        </a:xfrm>
+      </p:grpSpPr>
+      <p:grpSp>
+        <p:nvGrpSpPr>
+          <p:cNvPr id="34" name="Group 33">
+            <a:extLst>
+              <a:ext uri="{FF2B5EF4-FFF2-40B4-BE49-F238E27FC236}">
+                <a16:creationId xmlns:a16="http://schemas.microsoft.com/office/drawing/2014/main" id="{78A4A6A6-47ED-2C2F-93EB-545A79F767A6}"/>
+              </a:ext>
+            </a:extLst>
+          </p:cNvPr>
+          <p:cNvGrpSpPr/>
+          <p:nvPr/>
+        </p:nvGrpSpPr>
+        <p:grpSpPr>
+          <a:xfrm>
+            <a:off x="217363" y="297117"/>
+            <a:ext cx="11667265" cy="6444900"/>
+            <a:chOff x="217363" y="297117"/>
+            <a:chExt cx="11667265" cy="6444900"/>
+          </a:xfrm>
+        </p:grpSpPr>
+        <p:sp>
+          <p:nvSpPr>
+            <p:cNvPr id="18" name="Rectangle 17">
+              <a:extLst>
+                <a:ext uri="{FF2B5EF4-FFF2-40B4-BE49-F238E27FC236}">
+                  <a16:creationId xmlns:a16="http://schemas.microsoft.com/office/drawing/2014/main" id="{4A08397E-4234-57DC-1AA1-8BEBE88D69AA}"/>
+                </a:ext>
+              </a:extLst>
+            </p:cNvPr>
+            <p:cNvSpPr/>
+            <p:nvPr/>
+          </p:nvSpPr>
+          <p:spPr>
+            <a:xfrm>
+              <a:off x="217363" y="297117"/>
+              <a:ext cx="11667265" cy="6444900"/>
+            </a:xfrm>
+            <a:prstGeom prst="rect">
+              <a:avLst/>
+            </a:prstGeom>
+            <a:solidFill>
+              <a:schemeClr val="bg1"/>
+            </a:solidFill>
+            <a:ln>
+              <a:noFill/>
+            </a:ln>
+          </p:spPr>
+          <p:style>
+            <a:lnRef idx="2">
+              <a:schemeClr val="accent1">
+                <a:shade val="50000"/>
+              </a:schemeClr>
+            </a:lnRef>
+            <a:fillRef idx="1">
+              <a:schemeClr val="accent1"/>
+            </a:fillRef>
+            <a:effectRef idx="0">
+              <a:schemeClr val="accent1"/>
+            </a:effectRef>
+            <a:fontRef idx="minor">
+              <a:schemeClr val="lt1"/>
+            </a:fontRef>
+          </p:style>
+          <p:txBody>
+            <a:bodyPr rtlCol="0" anchor="ctr"/>
+            <a:lstStyle/>
+            <a:p>
+              <a:pPr algn="ctr"/>
+              <a:endParaRPr lang="en-TW"/>
+            </a:p>
+          </p:txBody>
+        </p:sp>
+        <p:sp>
+          <p:nvSpPr>
+            <p:cNvPr id="3" name="Rectangle 2">
+              <a:extLst>
+                <a:ext uri="{FF2B5EF4-FFF2-40B4-BE49-F238E27FC236}">
+                  <a16:creationId xmlns:a16="http://schemas.microsoft.com/office/drawing/2014/main" id="{6702A7A9-7AE2-D931-A32B-8F4A3A674AB9}"/>
+                </a:ext>
+              </a:extLst>
+            </p:cNvPr>
+            <p:cNvSpPr/>
+            <p:nvPr/>
+          </p:nvSpPr>
+          <p:spPr>
+            <a:xfrm>
+              <a:off x="980918" y="297117"/>
+              <a:ext cx="9918730" cy="5852160"/>
+            </a:xfrm>
+            <a:prstGeom prst="rect">
+              <a:avLst/>
+            </a:prstGeom>
+            <a:solidFill>
+              <a:schemeClr val="bg1"/>
+            </a:solidFill>
+            <a:ln>
+              <a:noFill/>
+            </a:ln>
+          </p:spPr>
+          <p:style>
+            <a:lnRef idx="2">
+              <a:schemeClr val="accent1">
+                <a:shade val="50000"/>
+              </a:schemeClr>
+            </a:lnRef>
+            <a:fillRef idx="1">
+              <a:schemeClr val="accent1"/>
+            </a:fillRef>
+            <a:effectRef idx="0">
+              <a:schemeClr val="accent1"/>
+            </a:effectRef>
+            <a:fontRef idx="minor">
+              <a:schemeClr val="lt1"/>
+            </a:fontRef>
+          </p:style>
+          <p:txBody>
+            <a:bodyPr rtlCol="0" anchor="ctr"/>
+            <a:lstStyle/>
+            <a:p>
+              <a:pPr algn="ctr"/>
+              <a:endParaRPr lang="en-TW"/>
+            </a:p>
+          </p:txBody>
+        </p:sp>
+        <p:sp>
+          <p:nvSpPr>
+            <p:cNvPr id="4" name="Rectangle 3">
+              <a:extLst>
+                <a:ext uri="{FF2B5EF4-FFF2-40B4-BE49-F238E27FC236}">
+                  <a16:creationId xmlns:a16="http://schemas.microsoft.com/office/drawing/2014/main" id="{B2E4E1CA-A4C7-3C93-7088-4A7135EA36C0}"/>
+                </a:ext>
+              </a:extLst>
+            </p:cNvPr>
+            <p:cNvSpPr/>
+            <p:nvPr/>
+          </p:nvSpPr>
+          <p:spPr>
+            <a:xfrm>
+              <a:off x="2785872" y="833850"/>
+              <a:ext cx="7759130" cy="4506724"/>
+            </a:xfrm>
+            <a:prstGeom prst="rect">
+              <a:avLst/>
+            </a:prstGeom>
+            <a:noFill/>
+            <a:ln w="19050">
+              <a:solidFill>
+                <a:schemeClr val="tx1"/>
+              </a:solidFill>
+            </a:ln>
+          </p:spPr>
+          <p:style>
+            <a:lnRef idx="2">
+              <a:schemeClr val="accent1">
+                <a:shade val="50000"/>
+              </a:schemeClr>
+            </a:lnRef>
+            <a:fillRef idx="1">
+              <a:schemeClr val="accent1"/>
+            </a:fillRef>
+            <a:effectRef idx="0">
+              <a:schemeClr val="accent1"/>
+            </a:effectRef>
+            <a:fontRef idx="minor">
+              <a:schemeClr val="lt1"/>
+            </a:fontRef>
+          </p:style>
+          <p:txBody>
+            <a:bodyPr rtlCol="0" anchor="ctr"/>
+            <a:lstStyle/>
+            <a:p>
+              <a:pPr algn="just"/>
+              <a:r>
+                <a:rPr lang="en-US" sz="2000" u="sng" dirty="0">
+                  <a:solidFill>
+                    <a:schemeClr val="accent6">
+                      <a:lumMod val="75000"/>
+                    </a:schemeClr>
+                  </a:solidFill>
+                  <a:latin typeface="Calibri" panose="020F0502020204030204"/>
+                </a:rPr>
+                <a:t>What is the stance of the tweet below with respect to 'Legalization of Abortion'?</a:t>
+              </a:r>
+              <a:r>
+                <a:rPr lang="en-US" sz="2000" dirty="0">
+                  <a:solidFill>
+                    <a:schemeClr val="tx1"/>
+                  </a:solidFill>
+                  <a:latin typeface="Calibri" panose="020F0502020204030204"/>
+                </a:rPr>
+                <a:t> </a:t>
+              </a:r>
+              <a:r>
+                <a:rPr lang="en-US" sz="2000" dirty="0">
+                  <a:solidFill>
+                    <a:srgbClr val="7030A0"/>
+                  </a:solidFill>
+                </a:rPr>
+                <a:t>If we can infer from the tweet that the tweeter supports 'Legalization of Abortion', please label it as </a:t>
+              </a:r>
+              <a:r>
+                <a:rPr lang="en-US" sz="2000" u="sng" dirty="0">
+                  <a:solidFill>
+                    <a:srgbClr val="7030A0"/>
+                  </a:solidFill>
+                </a:rPr>
+                <a:t>'in-favor'</a:t>
+              </a:r>
+              <a:r>
+                <a:rPr lang="en-US" sz="2000" dirty="0">
+                  <a:solidFill>
+                    <a:srgbClr val="7030A0"/>
+                  </a:solidFill>
+                </a:rPr>
+                <a:t>. If we can infer from the tweet that the tweeter is against 'Legalization of Abortion', please label is as </a:t>
+              </a:r>
+              <a:r>
+                <a:rPr lang="en-US" sz="2000" u="sng" dirty="0">
+                  <a:solidFill>
+                    <a:srgbClr val="7030A0"/>
+                  </a:solidFill>
+                </a:rPr>
+                <a:t>'against'</a:t>
+              </a:r>
+              <a:r>
+                <a:rPr lang="en-US" sz="2000" dirty="0">
+                  <a:solidFill>
+                    <a:srgbClr val="7030A0"/>
+                  </a:solidFill>
+                </a:rPr>
+                <a:t>. If we can infer from the tweet that the tweeter has a neutral stance towards 'Legalization of Abortion', please label it as </a:t>
+              </a:r>
+              <a:r>
+                <a:rPr lang="en-US" sz="2000" u="sng" dirty="0">
+                  <a:solidFill>
+                    <a:srgbClr val="7030A0"/>
+                  </a:solidFill>
+                </a:rPr>
+                <a:t>'neutral-or-unclear'</a:t>
+              </a:r>
+              <a:r>
+                <a:rPr lang="en-US" sz="2000" dirty="0">
+                  <a:solidFill>
+                    <a:srgbClr val="7030A0"/>
+                  </a:solidFill>
+                </a:rPr>
+                <a:t>. If there is no clue in the tweet to reveal the stance of the tweeter towards 'Legalization of Abortion', please also label is as </a:t>
+              </a:r>
+              <a:r>
+                <a:rPr lang="en-US" sz="2000" u="sng" dirty="0">
+                  <a:solidFill>
+                    <a:srgbClr val="7030A0"/>
+                  </a:solidFill>
+                </a:rPr>
+                <a:t>'neutral-or-unclear'</a:t>
+              </a:r>
+              <a:r>
+                <a:rPr lang="en-US" sz="2000" dirty="0">
+                  <a:solidFill>
+                    <a:srgbClr val="7030A0"/>
+                  </a:solidFill>
+                </a:rPr>
+                <a:t>. </a:t>
+              </a:r>
+              <a:r>
+                <a:rPr lang="en-US" sz="2000" dirty="0">
+                  <a:solidFill>
+                    <a:prstClr val="black"/>
+                  </a:solidFill>
+                  <a:latin typeface="Calibri" panose="020F0502020204030204"/>
+                </a:rPr>
+                <a:t>Here is the tweet: </a:t>
+              </a:r>
+              <a:r>
+                <a:rPr lang="en-US" sz="2000" dirty="0">
+                  <a:solidFill>
+                    <a:schemeClr val="accent5">
+                      <a:lumMod val="75000"/>
+                    </a:schemeClr>
+                  </a:solidFill>
+                  <a:latin typeface="Calibri" panose="020F0502020204030204"/>
+                </a:rPr>
+                <a:t>“</a:t>
+              </a:r>
+              <a:r>
+                <a:rPr lang="en-US" sz="2000" i="1" dirty="0">
+                  <a:solidFill>
+                    <a:schemeClr val="accent5">
+                      <a:lumMod val="75000"/>
+                    </a:schemeClr>
+                  </a:solidFill>
+                  <a:latin typeface="Calibri" panose="020F0502020204030204"/>
+                </a:rPr>
+                <a:t>It's so brilliant that #</a:t>
+              </a:r>
+              <a:r>
+                <a:rPr lang="en-US" sz="2000" i="1" dirty="0" err="1">
+                  <a:solidFill>
+                    <a:schemeClr val="accent5">
+                      <a:lumMod val="75000"/>
+                    </a:schemeClr>
+                  </a:solidFill>
+                  <a:latin typeface="Calibri" panose="020F0502020204030204"/>
+                </a:rPr>
+                <a:t>lovewins</a:t>
+              </a:r>
+              <a:r>
+                <a:rPr lang="en-US" sz="2000" i="1" dirty="0">
+                  <a:solidFill>
+                    <a:schemeClr val="accent5">
+                      <a:lumMod val="75000"/>
+                    </a:schemeClr>
+                  </a:solidFill>
+                  <a:latin typeface="Calibri" panose="020F0502020204030204"/>
+                </a:rPr>
+                <a:t> - now extend the equality to women's rights #</a:t>
+              </a:r>
+              <a:r>
+                <a:rPr lang="en-US" sz="2000" i="1" dirty="0" err="1">
+                  <a:solidFill>
+                    <a:schemeClr val="accent5">
+                      <a:lumMod val="75000"/>
+                    </a:schemeClr>
+                  </a:solidFill>
+                  <a:latin typeface="Calibri" panose="020F0502020204030204"/>
+                </a:rPr>
+                <a:t>abortionrights</a:t>
+              </a:r>
+              <a:r>
+                <a:rPr lang="en-US" sz="2000" i="1" dirty="0">
+                  <a:solidFill>
+                    <a:schemeClr val="accent5">
+                      <a:lumMod val="75000"/>
+                    </a:schemeClr>
+                  </a:solidFill>
+                  <a:latin typeface="Calibri" panose="020F0502020204030204"/>
+                </a:rPr>
+                <a:t>.</a:t>
+              </a:r>
+              <a:r>
+                <a:rPr lang="en-US" sz="2000" dirty="0">
+                  <a:solidFill>
+                    <a:schemeClr val="accent5">
+                      <a:lumMod val="75000"/>
+                    </a:schemeClr>
+                  </a:solidFill>
+                  <a:latin typeface="Calibri" panose="020F0502020204030204"/>
+                </a:rPr>
+                <a:t>” </a:t>
+              </a:r>
+              <a:r>
+                <a:rPr lang="en-US" sz="2000" dirty="0">
+                  <a:solidFill>
+                    <a:prstClr val="black"/>
+                  </a:solidFill>
+                  <a:latin typeface="Calibri" panose="020F0502020204030204"/>
+                </a:rPr>
+                <a:t>Please make sure that at the end of your response, use exactly one word from the following 3 categories to label the stance with respect to 'Legalization of Abortion': </a:t>
+              </a:r>
+              <a:r>
+                <a:rPr lang="en-US" sz="2000" u="sng" dirty="0">
+                  <a:solidFill>
+                    <a:srgbClr val="C00000"/>
+                  </a:solidFill>
+                  <a:latin typeface="Calibri" panose="020F0502020204030204"/>
+                </a:rPr>
+                <a:t>'in-favor', 'against', 'neutral-or-unclear'</a:t>
+              </a:r>
+              <a:r>
+                <a:rPr lang="en-US" sz="2000" dirty="0">
+                  <a:solidFill>
+                    <a:prstClr val="black"/>
+                  </a:solidFill>
+                  <a:latin typeface="Calibri" panose="020F0502020204030204"/>
+                </a:rPr>
+                <a:t>. </a:t>
+              </a:r>
+              <a:r>
+                <a:rPr lang="en-US" sz="2000" dirty="0">
+                  <a:solidFill>
+                    <a:prstClr val="black"/>
+                  </a:solidFill>
+                  <a:highlight>
+                    <a:srgbClr val="C0C0C0"/>
+                  </a:highlight>
+                  <a:latin typeface="Calibri" panose="020F0502020204030204"/>
+                </a:rPr>
+                <a:t>Let's think step by step.</a:t>
+              </a:r>
+            </a:p>
+          </p:txBody>
+        </p:sp>
+        <p:sp>
+          <p:nvSpPr>
+            <p:cNvPr id="7" name="TextBox 6">
+              <a:extLst>
+                <a:ext uri="{FF2B5EF4-FFF2-40B4-BE49-F238E27FC236}">
+                  <a16:creationId xmlns:a16="http://schemas.microsoft.com/office/drawing/2014/main" id="{EAEFACA3-34C9-EFD2-6471-4875AE8A7706}"/>
+                </a:ext>
+              </a:extLst>
+            </p:cNvPr>
+            <p:cNvSpPr txBox="1"/>
+            <p:nvPr/>
+          </p:nvSpPr>
+          <p:spPr>
+            <a:xfrm>
+              <a:off x="3742675" y="5523456"/>
+              <a:ext cx="1813560" cy="400110"/>
+            </a:xfrm>
+            <a:prstGeom prst="rect">
+              <a:avLst/>
+            </a:prstGeom>
+            <a:noFill/>
+          </p:spPr>
+          <p:txBody>
+            <a:bodyPr wrap="square" rtlCol="0">
+              <a:spAutoFit/>
+            </a:bodyPr>
+            <a:lstStyle/>
+            <a:p>
+              <a:pPr algn="ctr"/>
+              <a:r>
+                <a:rPr lang="en-TW" sz="2000" dirty="0">
+                  <a:solidFill>
+                    <a:srgbClr val="C00000"/>
+                  </a:solidFill>
+                  <a:latin typeface="Calibri" panose="020F0502020204030204"/>
+                </a:rPr>
+                <a:t>Possible Labels</a:t>
+              </a:r>
+            </a:p>
+          </p:txBody>
+        </p:sp>
+        <p:cxnSp>
+          <p:nvCxnSpPr>
+            <p:cNvPr id="12" name="Straight Arrow Connector 11">
+              <a:extLst>
+                <a:ext uri="{FF2B5EF4-FFF2-40B4-BE49-F238E27FC236}">
+                  <a16:creationId xmlns:a16="http://schemas.microsoft.com/office/drawing/2014/main" id="{5FA11A3B-A7B4-74B8-D97D-EEB8EBCCE252}"/>
+                </a:ext>
+              </a:extLst>
+            </p:cNvPr>
+            <p:cNvCxnSpPr>
+              <a:cxnSpLocks/>
+            </p:cNvCxnSpPr>
+            <p:nvPr/>
+          </p:nvCxnSpPr>
+          <p:spPr>
+            <a:xfrm flipV="1">
+              <a:off x="4649455" y="4934808"/>
+              <a:ext cx="0" cy="542448"/>
+            </a:xfrm>
+            <a:prstGeom prst="straightConnector1">
+              <a:avLst/>
+            </a:prstGeom>
+            <a:ln w="28575">
+              <a:solidFill>
+                <a:srgbClr val="C00000"/>
+              </a:solidFill>
+              <a:tailEnd type="triangle"/>
+            </a:ln>
+          </p:spPr>
+          <p:style>
+            <a:lnRef idx="1">
+              <a:schemeClr val="accent1"/>
+            </a:lnRef>
+            <a:fillRef idx="0">
+              <a:schemeClr val="accent1"/>
+            </a:fillRef>
+            <a:effectRef idx="0">
+              <a:schemeClr val="accent1"/>
+            </a:effectRef>
+            <a:fontRef idx="minor">
+              <a:schemeClr val="tx1"/>
+            </a:fontRef>
+          </p:style>
+        </p:cxnSp>
+        <p:sp>
+          <p:nvSpPr>
+            <p:cNvPr id="13" name="TextBox 12">
+              <a:extLst>
+                <a:ext uri="{FF2B5EF4-FFF2-40B4-BE49-F238E27FC236}">
+                  <a16:creationId xmlns:a16="http://schemas.microsoft.com/office/drawing/2014/main" id="{2D1734B4-36E4-9E85-057A-DB869157A9DC}"/>
+                </a:ext>
+              </a:extLst>
+            </p:cNvPr>
+            <p:cNvSpPr txBox="1"/>
+            <p:nvPr/>
+          </p:nvSpPr>
+          <p:spPr>
+            <a:xfrm>
+              <a:off x="235175" y="3646661"/>
+              <a:ext cx="2254981" cy="400110"/>
+            </a:xfrm>
+            <a:prstGeom prst="rect">
+              <a:avLst/>
+            </a:prstGeom>
+            <a:noFill/>
+          </p:spPr>
+          <p:txBody>
+            <a:bodyPr wrap="square" rtlCol="0">
+              <a:spAutoFit/>
+            </a:bodyPr>
+            <a:lstStyle/>
+            <a:p>
+              <a:pPr algn="ctr"/>
+              <a:r>
+                <a:rPr lang="en-TW" sz="2000" dirty="0">
+                  <a:solidFill>
+                    <a:schemeClr val="accent5">
+                      <a:lumMod val="75000"/>
+                    </a:schemeClr>
+                  </a:solidFill>
+                  <a:latin typeface="Calibri" panose="020F0502020204030204"/>
+                </a:rPr>
+                <a:t>Tweet of Interest</a:t>
+              </a:r>
+            </a:p>
+          </p:txBody>
+        </p:sp>
+        <p:cxnSp>
+          <p:nvCxnSpPr>
+            <p:cNvPr id="15" name="Straight Arrow Connector 14">
+              <a:extLst>
+                <a:ext uri="{FF2B5EF4-FFF2-40B4-BE49-F238E27FC236}">
+                  <a16:creationId xmlns:a16="http://schemas.microsoft.com/office/drawing/2014/main" id="{B07EEF9E-E86A-2EA7-9EAB-75730DB9B3A8}"/>
+                </a:ext>
+              </a:extLst>
+            </p:cNvPr>
+            <p:cNvCxnSpPr>
+              <a:cxnSpLocks/>
+            </p:cNvCxnSpPr>
+            <p:nvPr/>
+          </p:nvCxnSpPr>
+          <p:spPr>
+            <a:xfrm>
+              <a:off x="2323710" y="3846716"/>
+              <a:ext cx="381779" cy="0"/>
+            </a:xfrm>
+            <a:prstGeom prst="straightConnector1">
+              <a:avLst/>
+            </a:prstGeom>
+            <a:ln w="28575">
+              <a:solidFill>
+                <a:schemeClr val="accent5">
+                  <a:lumMod val="75000"/>
+                </a:schemeClr>
+              </a:solidFill>
+              <a:tailEnd type="triangle"/>
+            </a:ln>
+          </p:spPr>
+          <p:style>
+            <a:lnRef idx="1">
+              <a:schemeClr val="accent1"/>
+            </a:lnRef>
+            <a:fillRef idx="0">
+              <a:schemeClr val="accent1"/>
+            </a:fillRef>
+            <a:effectRef idx="0">
+              <a:schemeClr val="accent1"/>
+            </a:effectRef>
+            <a:fontRef idx="minor">
+              <a:schemeClr val="tx1"/>
+            </a:fontRef>
+          </p:style>
+        </p:cxnSp>
+        <p:sp>
+          <p:nvSpPr>
+            <p:cNvPr id="28" name="TextBox 27">
+              <a:extLst>
+                <a:ext uri="{FF2B5EF4-FFF2-40B4-BE49-F238E27FC236}">
+                  <a16:creationId xmlns:a16="http://schemas.microsoft.com/office/drawing/2014/main" id="{9508596F-38C3-337E-28B6-D03C85B6763A}"/>
+                </a:ext>
+              </a:extLst>
+            </p:cNvPr>
+            <p:cNvSpPr txBox="1"/>
+            <p:nvPr/>
+          </p:nvSpPr>
+          <p:spPr>
+            <a:xfrm>
+              <a:off x="8317992" y="5523456"/>
+              <a:ext cx="2227010" cy="707886"/>
+            </a:xfrm>
+            <a:prstGeom prst="rect">
+              <a:avLst/>
+            </a:prstGeom>
+            <a:noFill/>
+          </p:spPr>
+          <p:txBody>
+            <a:bodyPr wrap="square" rtlCol="0">
+              <a:spAutoFit/>
+            </a:bodyPr>
+            <a:lstStyle/>
+            <a:p>
+              <a:pPr algn="ctr"/>
+              <a:r>
+                <a:rPr lang="en-TW" sz="2000" dirty="0">
+                  <a:latin typeface="Calibri" panose="020F0502020204030204"/>
+                </a:rPr>
+                <a:t>Request for </a:t>
+              </a:r>
+            </a:p>
+            <a:p>
+              <a:pPr algn="ctr"/>
+              <a:r>
+                <a:rPr lang="en-TW" sz="2000" dirty="0">
+                  <a:latin typeface="Calibri" panose="020F0502020204030204"/>
+                </a:rPr>
+                <a:t>Chain-of-Thought</a:t>
+              </a:r>
+            </a:p>
+          </p:txBody>
+        </p:sp>
+        <p:cxnSp>
+          <p:nvCxnSpPr>
+            <p:cNvPr id="29" name="Straight Arrow Connector 28">
+              <a:extLst>
+                <a:ext uri="{FF2B5EF4-FFF2-40B4-BE49-F238E27FC236}">
+                  <a16:creationId xmlns:a16="http://schemas.microsoft.com/office/drawing/2014/main" id="{156A9EDD-FF2A-ECB6-C7A3-1EF9AAE44554}"/>
+                </a:ext>
+              </a:extLst>
+            </p:cNvPr>
+            <p:cNvCxnSpPr>
+              <a:cxnSpLocks/>
+            </p:cNvCxnSpPr>
+            <p:nvPr/>
+          </p:nvCxnSpPr>
+          <p:spPr>
+            <a:xfrm flipV="1">
+              <a:off x="9431496" y="4934808"/>
+              <a:ext cx="0" cy="606456"/>
+            </a:xfrm>
+            <a:prstGeom prst="straightConnector1">
+              <a:avLst/>
+            </a:prstGeom>
+            <a:ln w="28575">
+              <a:solidFill>
+                <a:schemeClr val="tx1"/>
+              </a:solidFill>
+              <a:tailEnd type="triangle"/>
+            </a:ln>
+          </p:spPr>
+          <p:style>
+            <a:lnRef idx="1">
+              <a:schemeClr val="accent1"/>
+            </a:lnRef>
+            <a:fillRef idx="0">
+              <a:schemeClr val="accent1"/>
+            </a:fillRef>
+            <a:effectRef idx="0">
+              <a:schemeClr val="accent1"/>
+            </a:effectRef>
+            <a:fontRef idx="minor">
+              <a:schemeClr val="tx1"/>
+            </a:fontRef>
+          </p:style>
+        </p:cxnSp>
+      </p:grpSp>
+    </p:spTree>
+    <p:extLst>
+      <p:ext uri="{BB962C8B-B14F-4D97-AF65-F5344CB8AC3E}">
+        <p14:creationId xmlns:p14="http://schemas.microsoft.com/office/powerpoint/2010/main" val="190153235"/>
+      </p:ext>
+    </p:extLst>
+  </p:cSld>
+  <p:clrMapOvr>
+    <a:masterClrMapping/>
+  </p:clrMapOvr>
+</p:sld>
+</file>
+
+<file path=ppt/slides/slide13.xml><?xml version="1.0" encoding="utf-8"?>
+<p:sld xmlns:a="http://schemas.openxmlformats.org/drawingml/2006/main" xmlns:r="http://schemas.openxmlformats.org/officeDocument/2006/relationships" xmlns:p="http://schemas.openxmlformats.org/presentationml/2006/main">
+  <p:cSld>
+    <p:spTree>
+      <p:nvGrpSpPr>
+        <p:cNvPr id="1" name=""/>
+        <p:cNvGrpSpPr/>
+        <p:nvPr/>
+      </p:nvGrpSpPr>
+      <p:grpSpPr>
+        <a:xfrm>
+          <a:off x="0" y="0"/>
+          <a:ext cx="0" cy="0"/>
+          <a:chOff x="0" y="0"/>
+          <a:chExt cx="0" cy="0"/>
+        </a:xfrm>
+      </p:grpSpPr>
+      <p:grpSp>
+        <p:nvGrpSpPr>
+          <p:cNvPr id="17" name="Group 16">
+            <a:extLst>
+              <a:ext uri="{FF2B5EF4-FFF2-40B4-BE49-F238E27FC236}">
+                <a16:creationId xmlns:a16="http://schemas.microsoft.com/office/drawing/2014/main" id="{DEC2BE0E-09E1-BA21-DA9C-9367561C0E54}"/>
+              </a:ext>
+            </a:extLst>
+          </p:cNvPr>
+          <p:cNvGrpSpPr/>
+          <p:nvPr/>
+        </p:nvGrpSpPr>
+        <p:grpSpPr>
+          <a:xfrm>
+            <a:off x="81061" y="1655063"/>
+            <a:ext cx="12034739" cy="3227833"/>
+            <a:chOff x="81061" y="1655063"/>
+            <a:chExt cx="12034739" cy="3227833"/>
+          </a:xfrm>
+        </p:grpSpPr>
+        <p:sp>
+          <p:nvSpPr>
+            <p:cNvPr id="11" name="Rectangle 10">
+              <a:extLst>
+                <a:ext uri="{FF2B5EF4-FFF2-40B4-BE49-F238E27FC236}">
+                  <a16:creationId xmlns:a16="http://schemas.microsoft.com/office/drawing/2014/main" id="{60AB4F84-CCF5-315D-B5B8-17B7D82CB891}"/>
+                </a:ext>
+              </a:extLst>
+            </p:cNvPr>
+            <p:cNvSpPr/>
+            <p:nvPr/>
+          </p:nvSpPr>
+          <p:spPr>
+            <a:xfrm>
+              <a:off x="81061" y="1655063"/>
+              <a:ext cx="12034739" cy="3227833"/>
+            </a:xfrm>
+            <a:prstGeom prst="rect">
+              <a:avLst/>
+            </a:prstGeom>
+            <a:solidFill>
+              <a:schemeClr val="bg1"/>
+            </a:solidFill>
+            <a:ln>
+              <a:noFill/>
+            </a:ln>
+          </p:spPr>
+          <p:style>
+            <a:lnRef idx="2">
+              <a:schemeClr val="accent1">
+                <a:shade val="50000"/>
+              </a:schemeClr>
+            </a:lnRef>
+            <a:fillRef idx="1">
+              <a:schemeClr val="accent1"/>
+            </a:fillRef>
+            <a:effectRef idx="0">
+              <a:schemeClr val="accent1"/>
+            </a:effectRef>
+            <a:fontRef idx="minor">
+              <a:schemeClr val="lt1"/>
+            </a:fontRef>
+          </p:style>
+          <p:txBody>
+            <a:bodyPr rtlCol="0" anchor="ctr"/>
+            <a:lstStyle/>
+            <a:p>
+              <a:pPr algn="ctr"/>
+              <a:endParaRPr lang="en-TW"/>
+            </a:p>
+          </p:txBody>
+        </p:sp>
+        <p:sp>
+          <p:nvSpPr>
+            <p:cNvPr id="9" name="TextBox 8">
+              <a:extLst>
+                <a:ext uri="{FF2B5EF4-FFF2-40B4-BE49-F238E27FC236}">
+                  <a16:creationId xmlns:a16="http://schemas.microsoft.com/office/drawing/2014/main" id="{9910E3E2-4912-7AF2-06D1-661059233874}"/>
+                </a:ext>
+              </a:extLst>
+            </p:cNvPr>
+            <p:cNvSpPr txBox="1"/>
+            <p:nvPr/>
+          </p:nvSpPr>
+          <p:spPr>
+            <a:xfrm>
+              <a:off x="1842454" y="1948152"/>
+              <a:ext cx="2227010" cy="492443"/>
+            </a:xfrm>
+            <a:prstGeom prst="rect">
+              <a:avLst/>
+            </a:prstGeom>
+            <a:noFill/>
+          </p:spPr>
+          <p:txBody>
+            <a:bodyPr wrap="square" rtlCol="0">
+              <a:spAutoFit/>
+            </a:bodyPr>
+            <a:lstStyle/>
+            <a:p>
+              <a:pPr algn="ctr"/>
+              <a:r>
+                <a:rPr lang="en-TW" sz="2600" b="1" dirty="0">
+                  <a:latin typeface="Calibri" panose="020F0502020204030204"/>
+                </a:rPr>
+                <a:t>Zero-shot</a:t>
+              </a:r>
+            </a:p>
+          </p:txBody>
+        </p:sp>
+        <p:sp>
+          <p:nvSpPr>
+            <p:cNvPr id="10" name="TextBox 9">
+              <a:extLst>
+                <a:ext uri="{FF2B5EF4-FFF2-40B4-BE49-F238E27FC236}">
+                  <a16:creationId xmlns:a16="http://schemas.microsoft.com/office/drawing/2014/main" id="{12932A7D-2B16-D199-2184-3E18939F265C}"/>
+                </a:ext>
+              </a:extLst>
+            </p:cNvPr>
+            <p:cNvSpPr txBox="1"/>
+            <p:nvPr/>
+          </p:nvSpPr>
+          <p:spPr>
+            <a:xfrm>
+              <a:off x="7975030" y="1948152"/>
+              <a:ext cx="2227010" cy="492443"/>
+            </a:xfrm>
+            <a:prstGeom prst="rect">
+              <a:avLst/>
+            </a:prstGeom>
+            <a:noFill/>
+          </p:spPr>
+          <p:txBody>
+            <a:bodyPr wrap="square" rtlCol="0">
+              <a:spAutoFit/>
+            </a:bodyPr>
+            <a:lstStyle/>
+            <a:p>
+              <a:pPr algn="ctr"/>
+              <a:r>
+                <a:rPr lang="en-TW" sz="2600" b="1" dirty="0">
+                  <a:latin typeface="Calibri" panose="020F0502020204030204"/>
+                </a:rPr>
+                <a:t>Zero-shot CoT</a:t>
+              </a:r>
+            </a:p>
+          </p:txBody>
+        </p:sp>
+        <p:pic>
+          <p:nvPicPr>
+            <p:cNvPr id="8" name="Picture 7" descr="Graphical user interface, text, application, chat or text message&#10;&#10;Description automatically generated">
+              <a:extLst>
+                <a:ext uri="{FF2B5EF4-FFF2-40B4-BE49-F238E27FC236}">
+                  <a16:creationId xmlns:a16="http://schemas.microsoft.com/office/drawing/2014/main" id="{2B826F89-AD79-FB76-2E1F-9CD68C632DDC}"/>
+                </a:ext>
+              </a:extLst>
+            </p:cNvPr>
+            <p:cNvPicPr>
+              <a:picLocks noChangeAspect="1"/>
+            </p:cNvPicPr>
+            <p:nvPr/>
+          </p:nvPicPr>
+          <p:blipFill rotWithShape="1">
+            <a:blip r:embed="rId2"/>
+            <a:srcRect t="2348"/>
+            <a:stretch/>
+          </p:blipFill>
+          <p:spPr>
+            <a:xfrm>
+              <a:off x="181293" y="2487168"/>
+              <a:ext cx="11829413" cy="2020824"/>
+            </a:xfrm>
+            <a:prstGeom prst="rect">
+              <a:avLst/>
+            </a:prstGeom>
+          </p:spPr>
+        </p:pic>
+      </p:grpSp>
+    </p:spTree>
+    <p:extLst>
+      <p:ext uri="{BB962C8B-B14F-4D97-AF65-F5344CB8AC3E}">
+        <p14:creationId xmlns:p14="http://schemas.microsoft.com/office/powerpoint/2010/main" val="397111021"/>
       </p:ext>
     </p:extLst>
   </p:cSld>
@@ -6273,6 +8976,1831 @@
     <p:extLst>
       <p:ext uri="{BB962C8B-B14F-4D97-AF65-F5344CB8AC3E}">
         <p14:creationId xmlns:p14="http://schemas.microsoft.com/office/powerpoint/2010/main" val="2983454470"/>
+      </p:ext>
+    </p:extLst>
+  </p:cSld>
+  <p:clrMapOvr>
+    <a:masterClrMapping/>
+  </p:clrMapOvr>
+</p:sld>
+</file>
+
+<file path=ppt/slides/slide6.xml><?xml version="1.0" encoding="utf-8"?>
+<p:sld xmlns:a="http://schemas.openxmlformats.org/drawingml/2006/main" xmlns:r="http://schemas.openxmlformats.org/officeDocument/2006/relationships" xmlns:p="http://schemas.openxmlformats.org/presentationml/2006/main">
+  <p:cSld>
+    <p:spTree>
+      <p:nvGrpSpPr>
+        <p:cNvPr id="1" name="Shape 60"/>
+        <p:cNvGrpSpPr/>
+        <p:nvPr/>
+      </p:nvGrpSpPr>
+      <p:grpSpPr>
+        <a:xfrm>
+          <a:off x="0" y="0"/>
+          <a:ext cx="0" cy="0"/>
+          <a:chOff x="0" y="0"/>
+          <a:chExt cx="0" cy="0"/>
+        </a:xfrm>
+      </p:grpSpPr>
+      <p:grpSp>
+        <p:nvGrpSpPr>
+          <p:cNvPr id="21" name="Group 20">
+            <a:extLst>
+              <a:ext uri="{FF2B5EF4-FFF2-40B4-BE49-F238E27FC236}">
+                <a16:creationId xmlns:a16="http://schemas.microsoft.com/office/drawing/2014/main" id="{13304A19-330E-B3A8-F422-75E67F59B5F2}"/>
+              </a:ext>
+            </a:extLst>
+          </p:cNvPr>
+          <p:cNvGrpSpPr/>
+          <p:nvPr/>
+        </p:nvGrpSpPr>
+        <p:grpSpPr>
+          <a:xfrm>
+            <a:off x="1154293" y="858644"/>
+            <a:ext cx="10048173" cy="4304371"/>
+            <a:chOff x="1154293" y="858644"/>
+            <a:chExt cx="10048173" cy="4304371"/>
+          </a:xfrm>
+        </p:grpSpPr>
+        <p:grpSp>
+          <p:nvGrpSpPr>
+            <p:cNvPr id="16" name="Group 15">
+              <a:extLst>
+                <a:ext uri="{FF2B5EF4-FFF2-40B4-BE49-F238E27FC236}">
+                  <a16:creationId xmlns:a16="http://schemas.microsoft.com/office/drawing/2014/main" id="{A6F8E390-86C2-E272-8F79-1FF736A5F1D2}"/>
+                </a:ext>
+              </a:extLst>
+            </p:cNvPr>
+            <p:cNvGrpSpPr/>
+            <p:nvPr/>
+          </p:nvGrpSpPr>
+          <p:grpSpPr>
+            <a:xfrm>
+              <a:off x="1154293" y="858644"/>
+              <a:ext cx="10048173" cy="4304371"/>
+              <a:chOff x="1154293" y="858644"/>
+              <a:chExt cx="10048173" cy="4304371"/>
+            </a:xfrm>
+          </p:grpSpPr>
+          <p:sp>
+            <p:nvSpPr>
+              <p:cNvPr id="15" name="Rectangle 14">
+                <a:extLst>
+                  <a:ext uri="{FF2B5EF4-FFF2-40B4-BE49-F238E27FC236}">
+                    <a16:creationId xmlns:a16="http://schemas.microsoft.com/office/drawing/2014/main" id="{79D7C581-5371-EAFA-BE53-2BD5C8B65402}"/>
+                  </a:ext>
+                </a:extLst>
+              </p:cNvPr>
+              <p:cNvSpPr/>
+              <p:nvPr/>
+            </p:nvSpPr>
+            <p:spPr>
+              <a:xfrm>
+                <a:off x="1154293" y="858644"/>
+                <a:ext cx="10048173" cy="4304371"/>
+              </a:xfrm>
+              <a:prstGeom prst="rect">
+                <a:avLst/>
+              </a:prstGeom>
+              <a:solidFill>
+                <a:schemeClr val="bg1"/>
+              </a:solidFill>
+              <a:ln>
+                <a:noFill/>
+              </a:ln>
+            </p:spPr>
+            <p:style>
+              <a:lnRef idx="2">
+                <a:schemeClr val="accent1">
+                  <a:shade val="50000"/>
+                </a:schemeClr>
+              </a:lnRef>
+              <a:fillRef idx="1">
+                <a:schemeClr val="accent1"/>
+              </a:fillRef>
+              <a:effectRef idx="0">
+                <a:schemeClr val="accent1"/>
+              </a:effectRef>
+              <a:fontRef idx="minor">
+                <a:schemeClr val="lt1"/>
+              </a:fontRef>
+            </p:style>
+            <p:txBody>
+              <a:bodyPr rtlCol="0" anchor="ctr"/>
+              <a:lstStyle/>
+              <a:p>
+                <a:pPr algn="ctr"/>
+                <a:endParaRPr lang="en-TW"/>
+              </a:p>
+            </p:txBody>
+          </p:sp>
+          <p:grpSp>
+            <p:nvGrpSpPr>
+              <p:cNvPr id="14" name="Group 13">
+                <a:extLst>
+                  <a:ext uri="{FF2B5EF4-FFF2-40B4-BE49-F238E27FC236}">
+                    <a16:creationId xmlns:a16="http://schemas.microsoft.com/office/drawing/2014/main" id="{8C5DC928-19FE-9833-1E8D-12B0AE78B5B4}"/>
+                  </a:ext>
+                </a:extLst>
+              </p:cNvPr>
+              <p:cNvGrpSpPr/>
+              <p:nvPr/>
+            </p:nvGrpSpPr>
+            <p:grpSpPr>
+              <a:xfrm>
+                <a:off x="1154293" y="1025912"/>
+                <a:ext cx="10048173" cy="4059043"/>
+                <a:chOff x="1154293" y="1025912"/>
+                <a:chExt cx="10048173" cy="4059043"/>
+              </a:xfrm>
+            </p:grpSpPr>
+            <p:pic>
+              <p:nvPicPr>
+                <p:cNvPr id="8" name="Picture 7" descr="Shape, rectangle&#10;&#10;Description automatically generated with medium confidence">
+                  <a:extLst>
+                    <a:ext uri="{FF2B5EF4-FFF2-40B4-BE49-F238E27FC236}">
+                      <a16:creationId xmlns:a16="http://schemas.microsoft.com/office/drawing/2014/main" id="{0B3E31AF-8863-D639-6273-8209838B5438}"/>
+                    </a:ext>
+                  </a:extLst>
+                </p:cNvPr>
+                <p:cNvPicPr>
+                  <a:picLocks noChangeAspect="1"/>
+                </p:cNvPicPr>
+                <p:nvPr/>
+              </p:nvPicPr>
+              <p:blipFill>
+                <a:blip r:embed="rId3"/>
+                <a:stretch>
+                  <a:fillRect/>
+                </a:stretch>
+              </p:blipFill>
+              <p:spPr>
+                <a:xfrm>
+                  <a:off x="1154293" y="1784194"/>
+                  <a:ext cx="10048173" cy="3300761"/>
+                </a:xfrm>
+                <a:prstGeom prst="rect">
+                  <a:avLst/>
+                </a:prstGeom>
+              </p:spPr>
+            </p:pic>
+            <p:sp>
+              <p:nvSpPr>
+                <p:cNvPr id="9" name="Rectangle 8">
+                  <a:extLst>
+                    <a:ext uri="{FF2B5EF4-FFF2-40B4-BE49-F238E27FC236}">
+                      <a16:creationId xmlns:a16="http://schemas.microsoft.com/office/drawing/2014/main" id="{6058B1BB-6771-A414-052E-0D4E6C6E51B6}"/>
+                    </a:ext>
+                  </a:extLst>
+                </p:cNvPr>
+                <p:cNvSpPr/>
+                <p:nvPr/>
+              </p:nvSpPr>
+              <p:spPr>
+                <a:xfrm>
+                  <a:off x="1235110" y="1025912"/>
+                  <a:ext cx="4362803" cy="588498"/>
+                </a:xfrm>
+                <a:prstGeom prst="rect">
+                  <a:avLst/>
+                </a:prstGeom>
+                <a:solidFill>
+                  <a:schemeClr val="bg1">
+                    <a:lumMod val="85000"/>
+                  </a:schemeClr>
+                </a:solidFill>
+                <a:ln w="38100">
+                  <a:noFill/>
+                </a:ln>
+              </p:spPr>
+              <p:style>
+                <a:lnRef idx="2">
+                  <a:schemeClr val="accent1">
+                    <a:shade val="50000"/>
+                  </a:schemeClr>
+                </a:lnRef>
+                <a:fillRef idx="1">
+                  <a:schemeClr val="accent1"/>
+                </a:fillRef>
+                <a:effectRef idx="0">
+                  <a:schemeClr val="accent1"/>
+                </a:effectRef>
+                <a:fontRef idx="minor">
+                  <a:schemeClr val="lt1"/>
+                </a:fontRef>
+              </p:style>
+              <p:txBody>
+                <a:bodyPr rtlCol="0" anchor="ctr"/>
+                <a:lstStyle/>
+                <a:p>
+                  <a:pPr algn="ctr"/>
+                  <a:r>
+                    <a:rPr lang="en-US" sz="2400" b="1" dirty="0">
+                      <a:solidFill>
+                        <a:schemeClr val="tx1"/>
+                      </a:solidFill>
+                      <a:latin typeface="-apple-system"/>
+                    </a:rPr>
+                    <a:t>Encoder</a:t>
+                  </a:r>
+                  <a:endParaRPr lang="en-TW" sz="2400" b="1" dirty="0">
+                    <a:solidFill>
+                      <a:schemeClr val="tx1"/>
+                    </a:solidFill>
+                    <a:latin typeface="-apple-system"/>
+                  </a:endParaRPr>
+                </a:p>
+              </p:txBody>
+            </p:sp>
+            <p:sp>
+              <p:nvSpPr>
+                <p:cNvPr id="12" name="Rectangle 11">
+                  <a:extLst>
+                    <a:ext uri="{FF2B5EF4-FFF2-40B4-BE49-F238E27FC236}">
+                      <a16:creationId xmlns:a16="http://schemas.microsoft.com/office/drawing/2014/main" id="{6050A37B-1853-53D0-9F87-EF8D0BAB9910}"/>
+                    </a:ext>
+                  </a:extLst>
+                </p:cNvPr>
+                <p:cNvSpPr/>
+                <p:nvPr/>
+              </p:nvSpPr>
+              <p:spPr>
+                <a:xfrm>
+                  <a:off x="6706641" y="1025912"/>
+                  <a:ext cx="4362803" cy="588498"/>
+                </a:xfrm>
+                <a:prstGeom prst="rect">
+                  <a:avLst/>
+                </a:prstGeom>
+                <a:solidFill>
+                  <a:schemeClr val="bg1">
+                    <a:lumMod val="85000"/>
+                  </a:schemeClr>
+                </a:solidFill>
+                <a:ln w="38100">
+                  <a:noFill/>
+                </a:ln>
+              </p:spPr>
+              <p:style>
+                <a:lnRef idx="2">
+                  <a:schemeClr val="accent1">
+                    <a:shade val="50000"/>
+                  </a:schemeClr>
+                </a:lnRef>
+                <a:fillRef idx="1">
+                  <a:schemeClr val="accent1"/>
+                </a:fillRef>
+                <a:effectRef idx="0">
+                  <a:schemeClr val="accent1"/>
+                </a:effectRef>
+                <a:fontRef idx="minor">
+                  <a:schemeClr val="lt1"/>
+                </a:fontRef>
+              </p:style>
+              <p:txBody>
+                <a:bodyPr rtlCol="0" anchor="ctr"/>
+                <a:lstStyle/>
+                <a:p>
+                  <a:pPr algn="ctr"/>
+                  <a:r>
+                    <a:rPr lang="en-US" sz="2400" b="1" dirty="0">
+                      <a:solidFill>
+                        <a:schemeClr val="tx1"/>
+                      </a:solidFill>
+                      <a:latin typeface="-apple-system"/>
+                    </a:rPr>
+                    <a:t>Decoder</a:t>
+                  </a:r>
+                  <a:endParaRPr lang="en-TW" sz="2400" b="1" dirty="0">
+                    <a:solidFill>
+                      <a:schemeClr val="tx1"/>
+                    </a:solidFill>
+                    <a:latin typeface="-apple-system"/>
+                  </a:endParaRPr>
+                </a:p>
+              </p:txBody>
+            </p:sp>
+          </p:grpSp>
+        </p:grpSp>
+        <p:sp>
+          <p:nvSpPr>
+            <p:cNvPr id="17" name="Rectangle 16">
+              <a:extLst>
+                <a:ext uri="{FF2B5EF4-FFF2-40B4-BE49-F238E27FC236}">
+                  <a16:creationId xmlns:a16="http://schemas.microsoft.com/office/drawing/2014/main" id="{22015579-4CDB-7563-6F99-F4DA6B5FD2BF}"/>
+                </a:ext>
+              </a:extLst>
+            </p:cNvPr>
+            <p:cNvSpPr/>
+            <p:nvPr/>
+          </p:nvSpPr>
+          <p:spPr>
+            <a:xfrm>
+              <a:off x="1371600" y="4337824"/>
+              <a:ext cx="4159405" cy="613317"/>
+            </a:xfrm>
+            <a:prstGeom prst="rect">
+              <a:avLst/>
+            </a:prstGeom>
+            <a:noFill/>
+            <a:ln>
+              <a:noFill/>
+            </a:ln>
+          </p:spPr>
+          <p:style>
+            <a:lnRef idx="2">
+              <a:schemeClr val="accent1">
+                <a:shade val="50000"/>
+              </a:schemeClr>
+            </a:lnRef>
+            <a:fillRef idx="1">
+              <a:schemeClr val="accent1"/>
+            </a:fillRef>
+            <a:effectRef idx="0">
+              <a:schemeClr val="accent1"/>
+            </a:effectRef>
+            <a:fontRef idx="minor">
+              <a:schemeClr val="lt1"/>
+            </a:fontRef>
+          </p:style>
+          <p:txBody>
+            <a:bodyPr rtlCol="0" anchor="ctr"/>
+            <a:lstStyle/>
+            <a:p>
+              <a:pPr algn="ctr"/>
+              <a:r>
+                <a:rPr lang="en-TW" sz="2800" dirty="0">
+                  <a:solidFill>
+                    <a:schemeClr val="tx1"/>
+                  </a:solidFill>
+                </a:rPr>
+                <a:t>Tweet</a:t>
+              </a:r>
+            </a:p>
+          </p:txBody>
+        </p:sp>
+        <p:sp>
+          <p:nvSpPr>
+            <p:cNvPr id="18" name="Rectangle 17">
+              <a:extLst>
+                <a:ext uri="{FF2B5EF4-FFF2-40B4-BE49-F238E27FC236}">
+                  <a16:creationId xmlns:a16="http://schemas.microsoft.com/office/drawing/2014/main" id="{37F4AA12-517D-F62A-CDF7-257EB4222018}"/>
+                </a:ext>
+              </a:extLst>
+            </p:cNvPr>
+            <p:cNvSpPr/>
+            <p:nvPr/>
+          </p:nvSpPr>
+          <p:spPr>
+            <a:xfrm>
+              <a:off x="6913756" y="4337824"/>
+              <a:ext cx="2631688" cy="613317"/>
+            </a:xfrm>
+            <a:prstGeom prst="rect">
+              <a:avLst/>
+            </a:prstGeom>
+            <a:noFill/>
+            <a:ln>
+              <a:noFill/>
+            </a:ln>
+          </p:spPr>
+          <p:style>
+            <a:lnRef idx="2">
+              <a:schemeClr val="accent1">
+                <a:shade val="50000"/>
+              </a:schemeClr>
+            </a:lnRef>
+            <a:fillRef idx="1">
+              <a:schemeClr val="accent1"/>
+            </a:fillRef>
+            <a:effectRef idx="0">
+              <a:schemeClr val="accent1"/>
+            </a:effectRef>
+            <a:fontRef idx="minor">
+              <a:schemeClr val="lt1"/>
+            </a:fontRef>
+          </p:style>
+          <p:txBody>
+            <a:bodyPr rtlCol="0" anchor="ctr"/>
+            <a:lstStyle/>
+            <a:p>
+              <a:pPr algn="ctr"/>
+              <a:r>
+                <a:rPr lang="en-TW" sz="2400" dirty="0">
+                  <a:solidFill>
+                    <a:schemeClr val="tx1"/>
+                  </a:solidFill>
+                </a:rPr>
+                <a:t>Tweet Embedded in the Prompt</a:t>
+              </a:r>
+            </a:p>
+          </p:txBody>
+        </p:sp>
+        <p:sp>
+          <p:nvSpPr>
+            <p:cNvPr id="20" name="Rectangle 19">
+              <a:extLst>
+                <a:ext uri="{FF2B5EF4-FFF2-40B4-BE49-F238E27FC236}">
+                  <a16:creationId xmlns:a16="http://schemas.microsoft.com/office/drawing/2014/main" id="{696D1A38-9CC9-CA98-C763-21B7B6885352}"/>
+                </a:ext>
+              </a:extLst>
+            </p:cNvPr>
+            <p:cNvSpPr/>
+            <p:nvPr/>
+          </p:nvSpPr>
+          <p:spPr>
+            <a:xfrm>
+              <a:off x="9545444" y="4337824"/>
+              <a:ext cx="1524000" cy="613317"/>
+            </a:xfrm>
+            <a:prstGeom prst="rect">
+              <a:avLst/>
+            </a:prstGeom>
+            <a:noFill/>
+            <a:ln>
+              <a:noFill/>
+            </a:ln>
+          </p:spPr>
+          <p:style>
+            <a:lnRef idx="2">
+              <a:schemeClr val="accent1">
+                <a:shade val="50000"/>
+              </a:schemeClr>
+            </a:lnRef>
+            <a:fillRef idx="1">
+              <a:schemeClr val="accent1"/>
+            </a:fillRef>
+            <a:effectRef idx="0">
+              <a:schemeClr val="accent1"/>
+            </a:effectRef>
+            <a:fontRef idx="minor">
+              <a:schemeClr val="lt1"/>
+            </a:fontRef>
+          </p:style>
+          <p:txBody>
+            <a:bodyPr rtlCol="0" anchor="ctr"/>
+            <a:lstStyle/>
+            <a:p>
+              <a:pPr algn="ctr"/>
+              <a:r>
+                <a:rPr lang="en-TW" sz="2400" dirty="0">
+                  <a:solidFill>
+                    <a:schemeClr val="tx1"/>
+                  </a:solidFill>
+                </a:rPr>
+                <a:t>Generated Words</a:t>
+              </a:r>
+            </a:p>
+          </p:txBody>
+        </p:sp>
+      </p:grpSp>
+    </p:spTree>
+    <p:extLst>
+      <p:ext uri="{BB962C8B-B14F-4D97-AF65-F5344CB8AC3E}">
+        <p14:creationId xmlns:p14="http://schemas.microsoft.com/office/powerpoint/2010/main" val="2137920595"/>
+      </p:ext>
+    </p:extLst>
+  </p:cSld>
+  <p:clrMapOvr>
+    <a:masterClrMapping/>
+  </p:clrMapOvr>
+</p:sld>
+</file>
+
+<file path=ppt/slides/slide7.xml><?xml version="1.0" encoding="utf-8"?>
+<p:sld xmlns:a="http://schemas.openxmlformats.org/drawingml/2006/main" xmlns:r="http://schemas.openxmlformats.org/officeDocument/2006/relationships" xmlns:p="http://schemas.openxmlformats.org/presentationml/2006/main">
+  <p:cSld>
+    <p:spTree>
+      <p:nvGrpSpPr>
+        <p:cNvPr id="1" name="Shape 60"/>
+        <p:cNvGrpSpPr/>
+        <p:nvPr/>
+      </p:nvGrpSpPr>
+      <p:grpSpPr>
+        <a:xfrm>
+          <a:off x="0" y="0"/>
+          <a:ext cx="0" cy="0"/>
+          <a:chOff x="0" y="0"/>
+          <a:chExt cx="0" cy="0"/>
+        </a:xfrm>
+      </p:grpSpPr>
+      <p:pic>
+        <p:nvPicPr>
+          <p:cNvPr id="3" name="Picture 2" descr="Table&#10;&#10;Description automatically generated">
+            <a:extLst>
+              <a:ext uri="{FF2B5EF4-FFF2-40B4-BE49-F238E27FC236}">
+                <a16:creationId xmlns:a16="http://schemas.microsoft.com/office/drawing/2014/main" id="{D2707BE3-781B-8014-A403-A9112EC16C36}"/>
+              </a:ext>
+            </a:extLst>
+          </p:cNvPr>
+          <p:cNvPicPr>
+            <a:picLocks noChangeAspect="1"/>
+          </p:cNvPicPr>
+          <p:nvPr/>
+        </p:nvPicPr>
+        <p:blipFill>
+          <a:blip r:embed="rId3"/>
+          <a:stretch>
+            <a:fillRect/>
+          </a:stretch>
+        </p:blipFill>
+        <p:spPr>
+          <a:xfrm>
+            <a:off x="2209800" y="2241550"/>
+            <a:ext cx="7772400" cy="2242231"/>
+          </a:xfrm>
+          <a:prstGeom prst="rect">
+            <a:avLst/>
+          </a:prstGeom>
+        </p:spPr>
+      </p:pic>
+    </p:spTree>
+    <p:extLst>
+      <p:ext uri="{BB962C8B-B14F-4D97-AF65-F5344CB8AC3E}">
+        <p14:creationId xmlns:p14="http://schemas.microsoft.com/office/powerpoint/2010/main" val="3791466431"/>
+      </p:ext>
+    </p:extLst>
+  </p:cSld>
+  <p:clrMapOvr>
+    <a:masterClrMapping/>
+  </p:clrMapOvr>
+</p:sld>
+</file>
+
+<file path=ppt/slides/slide8.xml><?xml version="1.0" encoding="utf-8"?>
+<p:sld xmlns:a="http://schemas.openxmlformats.org/drawingml/2006/main" xmlns:r="http://schemas.openxmlformats.org/officeDocument/2006/relationships" xmlns:p="http://schemas.openxmlformats.org/presentationml/2006/main">
+  <p:cSld>
+    <p:spTree>
+      <p:nvGrpSpPr>
+        <p:cNvPr id="1" name="Shape 60"/>
+        <p:cNvGrpSpPr/>
+        <p:nvPr/>
+      </p:nvGrpSpPr>
+      <p:grpSpPr>
+        <a:xfrm>
+          <a:off x="0" y="0"/>
+          <a:ext cx="0" cy="0"/>
+          <a:chOff x="0" y="0"/>
+          <a:chExt cx="0" cy="0"/>
+        </a:xfrm>
+      </p:grpSpPr>
+      <p:grpSp>
+        <p:nvGrpSpPr>
+          <p:cNvPr id="25" name="Group 24">
+            <a:extLst>
+              <a:ext uri="{FF2B5EF4-FFF2-40B4-BE49-F238E27FC236}">
+                <a16:creationId xmlns:a16="http://schemas.microsoft.com/office/drawing/2014/main" id="{15C9C504-4468-D707-6374-241A78A91243}"/>
+              </a:ext>
+            </a:extLst>
+          </p:cNvPr>
+          <p:cNvGrpSpPr/>
+          <p:nvPr/>
+        </p:nvGrpSpPr>
+        <p:grpSpPr>
+          <a:xfrm>
+            <a:off x="482662" y="1536192"/>
+            <a:ext cx="10014650" cy="3529584"/>
+            <a:chOff x="482662" y="1536192"/>
+            <a:chExt cx="10014650" cy="3529584"/>
+          </a:xfrm>
+        </p:grpSpPr>
+        <p:sp>
+          <p:nvSpPr>
+            <p:cNvPr id="24" name="Rectangle 23">
+              <a:extLst>
+                <a:ext uri="{FF2B5EF4-FFF2-40B4-BE49-F238E27FC236}">
+                  <a16:creationId xmlns:a16="http://schemas.microsoft.com/office/drawing/2014/main" id="{43DC5BDF-FDF8-5094-5B78-E19C246E75CA}"/>
+                </a:ext>
+              </a:extLst>
+            </p:cNvPr>
+            <p:cNvSpPr/>
+            <p:nvPr/>
+          </p:nvSpPr>
+          <p:spPr>
+            <a:xfrm>
+              <a:off x="713232" y="1536192"/>
+              <a:ext cx="9784080" cy="3529584"/>
+            </a:xfrm>
+            <a:prstGeom prst="rect">
+              <a:avLst/>
+            </a:prstGeom>
+            <a:solidFill>
+              <a:schemeClr val="bg1"/>
+            </a:solidFill>
+            <a:ln>
+              <a:noFill/>
+            </a:ln>
+          </p:spPr>
+          <p:style>
+            <a:lnRef idx="2">
+              <a:schemeClr val="accent1">
+                <a:shade val="50000"/>
+              </a:schemeClr>
+            </a:lnRef>
+            <a:fillRef idx="1">
+              <a:schemeClr val="accent1"/>
+            </a:fillRef>
+            <a:effectRef idx="0">
+              <a:schemeClr val="accent1"/>
+            </a:effectRef>
+            <a:fontRef idx="minor">
+              <a:schemeClr val="lt1"/>
+            </a:fontRef>
+          </p:style>
+          <p:txBody>
+            <a:bodyPr rtlCol="0" anchor="ctr"/>
+            <a:lstStyle/>
+            <a:p>
+              <a:pPr algn="ctr"/>
+              <a:endParaRPr lang="en-TW"/>
+            </a:p>
+          </p:txBody>
+        </p:sp>
+        <p:sp>
+          <p:nvSpPr>
+            <p:cNvPr id="2" name="Rectangle 1">
+              <a:extLst>
+                <a:ext uri="{FF2B5EF4-FFF2-40B4-BE49-F238E27FC236}">
+                  <a16:creationId xmlns:a16="http://schemas.microsoft.com/office/drawing/2014/main" id="{074BF893-61FD-03FF-AEE1-1F7BE0843268}"/>
+                </a:ext>
+              </a:extLst>
+            </p:cNvPr>
+            <p:cNvSpPr/>
+            <p:nvPr/>
+          </p:nvSpPr>
+          <p:spPr>
+            <a:xfrm>
+              <a:off x="2500438" y="2286001"/>
+              <a:ext cx="7759130" cy="1892808"/>
+            </a:xfrm>
+            <a:prstGeom prst="rect">
+              <a:avLst/>
+            </a:prstGeom>
+            <a:noFill/>
+            <a:ln w="19050">
+              <a:solidFill>
+                <a:schemeClr val="tx1"/>
+              </a:solidFill>
+            </a:ln>
+          </p:spPr>
+          <p:style>
+            <a:lnRef idx="2">
+              <a:schemeClr val="accent1">
+                <a:shade val="50000"/>
+              </a:schemeClr>
+            </a:lnRef>
+            <a:fillRef idx="1">
+              <a:schemeClr val="accent1"/>
+            </a:fillRef>
+            <a:effectRef idx="0">
+              <a:schemeClr val="accent1"/>
+            </a:effectRef>
+            <a:fontRef idx="minor">
+              <a:schemeClr val="lt1"/>
+            </a:fontRef>
+          </p:style>
+          <p:txBody>
+            <a:bodyPr rtlCol="0" anchor="ctr"/>
+            <a:lstStyle/>
+            <a:p>
+              <a:pPr algn="just"/>
+              <a:r>
+                <a:rPr lang="en-US" sz="2000" u="sng" dirty="0">
+                  <a:solidFill>
+                    <a:schemeClr val="accent6">
+                      <a:lumMod val="75000"/>
+                    </a:schemeClr>
+                  </a:solidFill>
+                  <a:latin typeface="Calibri" panose="020F0502020204030204"/>
+                </a:rPr>
+                <a:t>What is the stance of the tweet below with respect to 'Legalization of Abortion'?</a:t>
+              </a:r>
+              <a:r>
+                <a:rPr lang="en-US" sz="2000" dirty="0">
+                  <a:solidFill>
+                    <a:prstClr val="black"/>
+                  </a:solidFill>
+                  <a:latin typeface="Calibri" panose="020F0502020204030204"/>
+                </a:rPr>
+                <a:t> </a:t>
+              </a:r>
+              <a:r>
+                <a:rPr lang="en-US" sz="1600" dirty="0">
+                  <a:solidFill>
+                    <a:prstClr val="black"/>
+                  </a:solidFill>
+                  <a:latin typeface="Calibri" panose="020F0502020204030204"/>
+                </a:rPr>
+                <a:t>Please use exactly one word from the following 3 categories to label it: </a:t>
+              </a:r>
+              <a:r>
+                <a:rPr lang="en-US" sz="2000" u="sng" dirty="0">
+                  <a:solidFill>
+                    <a:srgbClr val="C00000"/>
+                  </a:solidFill>
+                  <a:latin typeface="Calibri" panose="020F0502020204030204"/>
+                </a:rPr>
+                <a:t>'in-favor', 'against', 'neutral-or-unclear'.</a:t>
+              </a:r>
+              <a:r>
+                <a:rPr lang="en-US" sz="2000" dirty="0">
+                  <a:solidFill>
+                    <a:prstClr val="black"/>
+                  </a:solidFill>
+                  <a:latin typeface="Calibri" panose="020F0502020204030204"/>
+                </a:rPr>
+                <a:t> </a:t>
+              </a:r>
+              <a:r>
+                <a:rPr lang="en-US" sz="1600" dirty="0">
+                  <a:solidFill>
+                    <a:prstClr val="black"/>
+                  </a:solidFill>
+                  <a:latin typeface="Calibri" panose="020F0502020204030204"/>
+                </a:rPr>
+                <a:t>Here is the tweet: </a:t>
+              </a:r>
+              <a:r>
+                <a:rPr lang="en-US" sz="2000" dirty="0">
+                  <a:solidFill>
+                    <a:schemeClr val="accent5">
+                      <a:lumMod val="75000"/>
+                    </a:schemeClr>
+                  </a:solidFill>
+                  <a:latin typeface="Calibri" panose="020F0502020204030204"/>
+                </a:rPr>
+                <a:t>“It's so brilliant that #</a:t>
+              </a:r>
+              <a:r>
+                <a:rPr lang="en-US" sz="2000" dirty="0" err="1">
+                  <a:solidFill>
+                    <a:schemeClr val="accent5">
+                      <a:lumMod val="75000"/>
+                    </a:schemeClr>
+                  </a:solidFill>
+                  <a:latin typeface="Calibri" panose="020F0502020204030204"/>
+                </a:rPr>
+                <a:t>lovewins</a:t>
+              </a:r>
+              <a:r>
+                <a:rPr lang="en-US" sz="2000" dirty="0">
+                  <a:solidFill>
+                    <a:schemeClr val="accent5">
+                      <a:lumMod val="75000"/>
+                    </a:schemeClr>
+                  </a:solidFill>
+                  <a:latin typeface="Calibri" panose="020F0502020204030204"/>
+                </a:rPr>
+                <a:t> - now extend the equality to women's rights #</a:t>
+              </a:r>
+              <a:r>
+                <a:rPr lang="en-US" sz="2000" dirty="0" err="1">
+                  <a:solidFill>
+                    <a:schemeClr val="accent5">
+                      <a:lumMod val="75000"/>
+                    </a:schemeClr>
+                  </a:solidFill>
+                  <a:latin typeface="Calibri" panose="020F0502020204030204"/>
+                </a:rPr>
+                <a:t>abortionrights</a:t>
+              </a:r>
+              <a:r>
+                <a:rPr lang="en-US" sz="2000" dirty="0">
+                  <a:solidFill>
+                    <a:schemeClr val="accent5">
+                      <a:lumMod val="75000"/>
+                    </a:schemeClr>
+                  </a:solidFill>
+                  <a:latin typeface="Calibri" panose="020F0502020204030204"/>
+                </a:rPr>
+                <a:t>.”</a:t>
+              </a:r>
+              <a:r>
+                <a:rPr lang="en-US" sz="2000" dirty="0">
+                  <a:solidFill>
+                    <a:prstClr val="black"/>
+                  </a:solidFill>
+                  <a:latin typeface="Calibri" panose="020F0502020204030204"/>
+                </a:rPr>
+                <a:t> </a:t>
+              </a:r>
+              <a:r>
+                <a:rPr lang="en-US" sz="1600" dirty="0">
+                  <a:solidFill>
+                    <a:prstClr val="black"/>
+                  </a:solidFill>
+                  <a:latin typeface="Calibri" panose="020F0502020204030204"/>
+                </a:rPr>
+                <a:t>The stance of the tweet is: </a:t>
+              </a:r>
+            </a:p>
+          </p:txBody>
+        </p:sp>
+        <p:sp>
+          <p:nvSpPr>
+            <p:cNvPr id="8" name="TextBox 7">
+              <a:extLst>
+                <a:ext uri="{FF2B5EF4-FFF2-40B4-BE49-F238E27FC236}">
+                  <a16:creationId xmlns:a16="http://schemas.microsoft.com/office/drawing/2014/main" id="{8CFAF8A9-36DF-56D8-7A8C-95D2A67A0DAD}"/>
+                </a:ext>
+              </a:extLst>
+            </p:cNvPr>
+            <p:cNvSpPr txBox="1"/>
+            <p:nvPr/>
+          </p:nvSpPr>
+          <p:spPr>
+            <a:xfrm>
+              <a:off x="2509043" y="1653860"/>
+              <a:ext cx="2254981" cy="400110"/>
+            </a:xfrm>
+            <a:prstGeom prst="rect">
+              <a:avLst/>
+            </a:prstGeom>
+            <a:noFill/>
+          </p:spPr>
+          <p:txBody>
+            <a:bodyPr wrap="square" rtlCol="0">
+              <a:spAutoFit/>
+            </a:bodyPr>
+            <a:lstStyle/>
+            <a:p>
+              <a:pPr algn="ctr"/>
+              <a:r>
+                <a:rPr lang="en-TW" sz="2000" dirty="0">
+                  <a:solidFill>
+                    <a:schemeClr val="accent6">
+                      <a:lumMod val="75000"/>
+                    </a:schemeClr>
+                  </a:solidFill>
+                  <a:latin typeface="Calibri" panose="020F0502020204030204"/>
+                </a:rPr>
+                <a:t>Task Description</a:t>
+              </a:r>
+            </a:p>
+          </p:txBody>
+        </p:sp>
+        <p:cxnSp>
+          <p:nvCxnSpPr>
+            <p:cNvPr id="10" name="Straight Arrow Connector 9">
+              <a:extLst>
+                <a:ext uri="{FF2B5EF4-FFF2-40B4-BE49-F238E27FC236}">
+                  <a16:creationId xmlns:a16="http://schemas.microsoft.com/office/drawing/2014/main" id="{EE134B28-38C3-FEBC-76D0-E2D82096689D}"/>
+                </a:ext>
+              </a:extLst>
+            </p:cNvPr>
+            <p:cNvCxnSpPr>
+              <a:cxnSpLocks/>
+              <a:stCxn id="8" idx="2"/>
+            </p:cNvCxnSpPr>
+            <p:nvPr/>
+          </p:nvCxnSpPr>
+          <p:spPr>
+            <a:xfrm>
+              <a:off x="3636534" y="2053970"/>
+              <a:ext cx="11922" cy="460630"/>
+            </a:xfrm>
+            <a:prstGeom prst="straightConnector1">
+              <a:avLst/>
+            </a:prstGeom>
+            <a:ln w="28575">
+              <a:solidFill>
+                <a:schemeClr val="accent6">
+                  <a:lumMod val="75000"/>
+                </a:schemeClr>
+              </a:solidFill>
+              <a:tailEnd type="triangle"/>
+            </a:ln>
+          </p:spPr>
+          <p:style>
+            <a:lnRef idx="1">
+              <a:schemeClr val="accent1"/>
+            </a:lnRef>
+            <a:fillRef idx="0">
+              <a:schemeClr val="accent1"/>
+            </a:fillRef>
+            <a:effectRef idx="0">
+              <a:schemeClr val="accent1"/>
+            </a:effectRef>
+            <a:fontRef idx="minor">
+              <a:schemeClr val="tx1"/>
+            </a:fontRef>
+          </p:style>
+        </p:cxnSp>
+        <p:sp>
+          <p:nvSpPr>
+            <p:cNvPr id="12" name="TextBox 11">
+              <a:extLst>
+                <a:ext uri="{FF2B5EF4-FFF2-40B4-BE49-F238E27FC236}">
+                  <a16:creationId xmlns:a16="http://schemas.microsoft.com/office/drawing/2014/main" id="{E087CB6D-9D82-F95C-9972-DA4C06707291}"/>
+                </a:ext>
+              </a:extLst>
+            </p:cNvPr>
+            <p:cNvSpPr txBox="1"/>
+            <p:nvPr/>
+          </p:nvSpPr>
+          <p:spPr>
+            <a:xfrm>
+              <a:off x="482662" y="2709709"/>
+              <a:ext cx="2254981" cy="400110"/>
+            </a:xfrm>
+            <a:prstGeom prst="rect">
+              <a:avLst/>
+            </a:prstGeom>
+            <a:noFill/>
+          </p:spPr>
+          <p:txBody>
+            <a:bodyPr wrap="square" rtlCol="0">
+              <a:spAutoFit/>
+            </a:bodyPr>
+            <a:lstStyle/>
+            <a:p>
+              <a:pPr algn="ctr"/>
+              <a:r>
+                <a:rPr lang="en-TW" sz="2000" dirty="0">
+                  <a:solidFill>
+                    <a:srgbClr val="C00000"/>
+                  </a:solidFill>
+                  <a:latin typeface="Calibri" panose="020F0502020204030204"/>
+                </a:rPr>
+                <a:t>Possible Labels</a:t>
+              </a:r>
+            </a:p>
+          </p:txBody>
+        </p:sp>
+        <p:cxnSp>
+          <p:nvCxnSpPr>
+            <p:cNvPr id="13" name="Straight Arrow Connector 12">
+              <a:extLst>
+                <a:ext uri="{FF2B5EF4-FFF2-40B4-BE49-F238E27FC236}">
+                  <a16:creationId xmlns:a16="http://schemas.microsoft.com/office/drawing/2014/main" id="{9E9A7B65-F9B2-B727-F48E-F0D0FED1DD35}"/>
+                </a:ext>
+              </a:extLst>
+            </p:cNvPr>
+            <p:cNvCxnSpPr>
+              <a:cxnSpLocks/>
+              <a:stCxn id="12" idx="2"/>
+              <a:endCxn id="2" idx="1"/>
+            </p:cNvCxnSpPr>
+            <p:nvPr/>
+          </p:nvCxnSpPr>
+          <p:spPr>
+            <a:xfrm>
+              <a:off x="1610153" y="3109819"/>
+              <a:ext cx="890285" cy="122586"/>
+            </a:xfrm>
+            <a:prstGeom prst="straightConnector1">
+              <a:avLst/>
+            </a:prstGeom>
+            <a:ln w="28575">
+              <a:solidFill>
+                <a:srgbClr val="C00000"/>
+              </a:solidFill>
+              <a:tailEnd type="triangle"/>
+            </a:ln>
+          </p:spPr>
+          <p:style>
+            <a:lnRef idx="1">
+              <a:schemeClr val="accent1"/>
+            </a:lnRef>
+            <a:fillRef idx="0">
+              <a:schemeClr val="accent1"/>
+            </a:fillRef>
+            <a:effectRef idx="0">
+              <a:schemeClr val="accent1"/>
+            </a:effectRef>
+            <a:fontRef idx="minor">
+              <a:schemeClr val="tx1"/>
+            </a:fontRef>
+          </p:style>
+        </p:cxnSp>
+        <p:sp>
+          <p:nvSpPr>
+            <p:cNvPr id="17" name="TextBox 16">
+              <a:extLst>
+                <a:ext uri="{FF2B5EF4-FFF2-40B4-BE49-F238E27FC236}">
+                  <a16:creationId xmlns:a16="http://schemas.microsoft.com/office/drawing/2014/main" id="{7203F0DB-5576-9F4E-AFF9-CB1428296E75}"/>
+                </a:ext>
+              </a:extLst>
+            </p:cNvPr>
+            <p:cNvSpPr txBox="1"/>
+            <p:nvPr/>
+          </p:nvSpPr>
+          <p:spPr>
+            <a:xfrm>
+              <a:off x="6008147" y="4410840"/>
+              <a:ext cx="2254981" cy="400110"/>
+            </a:xfrm>
+            <a:prstGeom prst="rect">
+              <a:avLst/>
+            </a:prstGeom>
+            <a:noFill/>
+          </p:spPr>
+          <p:txBody>
+            <a:bodyPr wrap="square" rtlCol="0">
+              <a:spAutoFit/>
+            </a:bodyPr>
+            <a:lstStyle/>
+            <a:p>
+              <a:pPr algn="ctr"/>
+              <a:r>
+                <a:rPr lang="en-TW" sz="2000" dirty="0">
+                  <a:solidFill>
+                    <a:schemeClr val="accent5">
+                      <a:lumMod val="75000"/>
+                    </a:schemeClr>
+                  </a:solidFill>
+                  <a:latin typeface="Calibri" panose="020F0502020204030204"/>
+                </a:rPr>
+                <a:t>Tweet of Interest</a:t>
+              </a:r>
+            </a:p>
+          </p:txBody>
+        </p:sp>
+        <p:cxnSp>
+          <p:nvCxnSpPr>
+            <p:cNvPr id="18" name="Straight Arrow Connector 17">
+              <a:extLst>
+                <a:ext uri="{FF2B5EF4-FFF2-40B4-BE49-F238E27FC236}">
+                  <a16:creationId xmlns:a16="http://schemas.microsoft.com/office/drawing/2014/main" id="{7C3ECF62-DF12-4B49-6EA5-F8A7FDB0AEFE}"/>
+                </a:ext>
+              </a:extLst>
+            </p:cNvPr>
+            <p:cNvCxnSpPr>
+              <a:cxnSpLocks/>
+              <a:stCxn id="17" idx="0"/>
+            </p:cNvCxnSpPr>
+            <p:nvPr/>
+          </p:nvCxnSpPr>
+          <p:spPr>
+            <a:xfrm flipH="1" flipV="1">
+              <a:off x="7135637" y="3721608"/>
+              <a:ext cx="1" cy="689232"/>
+            </a:xfrm>
+            <a:prstGeom prst="straightConnector1">
+              <a:avLst/>
+            </a:prstGeom>
+            <a:ln w="28575">
+              <a:solidFill>
+                <a:schemeClr val="accent5">
+                  <a:lumMod val="75000"/>
+                </a:schemeClr>
+              </a:solidFill>
+              <a:tailEnd type="triangle"/>
+            </a:ln>
+          </p:spPr>
+          <p:style>
+            <a:lnRef idx="1">
+              <a:schemeClr val="accent1"/>
+            </a:lnRef>
+            <a:fillRef idx="0">
+              <a:schemeClr val="accent1"/>
+            </a:fillRef>
+            <a:effectRef idx="0">
+              <a:schemeClr val="accent1"/>
+            </a:effectRef>
+            <a:fontRef idx="minor">
+              <a:schemeClr val="tx1"/>
+            </a:fontRef>
+          </p:style>
+        </p:cxnSp>
+      </p:grpSp>
+    </p:spTree>
+    <p:extLst>
+      <p:ext uri="{BB962C8B-B14F-4D97-AF65-F5344CB8AC3E}">
+        <p14:creationId xmlns:p14="http://schemas.microsoft.com/office/powerpoint/2010/main" val="1029871097"/>
+      </p:ext>
+    </p:extLst>
+  </p:cSld>
+  <p:clrMapOvr>
+    <a:masterClrMapping/>
+  </p:clrMapOvr>
+</p:sld>
+</file>
+
+<file path=ppt/slides/slide9.xml><?xml version="1.0" encoding="utf-8"?>
+<p:sld xmlns:a="http://schemas.openxmlformats.org/drawingml/2006/main" xmlns:r="http://schemas.openxmlformats.org/officeDocument/2006/relationships" xmlns:p="http://schemas.openxmlformats.org/presentationml/2006/main">
+  <p:cSld>
+    <p:spTree>
+      <p:nvGrpSpPr>
+        <p:cNvPr id="1" name="Shape 60"/>
+        <p:cNvGrpSpPr/>
+        <p:nvPr/>
+      </p:nvGrpSpPr>
+      <p:grpSpPr>
+        <a:xfrm>
+          <a:off x="0" y="0"/>
+          <a:ext cx="0" cy="0"/>
+          <a:chOff x="0" y="0"/>
+          <a:chExt cx="0" cy="0"/>
+        </a:xfrm>
+      </p:grpSpPr>
+      <p:grpSp>
+        <p:nvGrpSpPr>
+          <p:cNvPr id="35" name="Group 34">
+            <a:extLst>
+              <a:ext uri="{FF2B5EF4-FFF2-40B4-BE49-F238E27FC236}">
+                <a16:creationId xmlns:a16="http://schemas.microsoft.com/office/drawing/2014/main" id="{F2B6D5BA-C7A9-B67A-0B23-1ECD3406FE02}"/>
+              </a:ext>
+            </a:extLst>
+          </p:cNvPr>
+          <p:cNvGrpSpPr/>
+          <p:nvPr/>
+        </p:nvGrpSpPr>
+        <p:grpSpPr>
+          <a:xfrm>
+            <a:off x="1319245" y="283464"/>
+            <a:ext cx="9918731" cy="5852160"/>
+            <a:chOff x="1319245" y="283464"/>
+            <a:chExt cx="9918731" cy="5852160"/>
+          </a:xfrm>
+        </p:grpSpPr>
+        <p:sp>
+          <p:nvSpPr>
+            <p:cNvPr id="34" name="Rectangle 33">
+              <a:extLst>
+                <a:ext uri="{FF2B5EF4-FFF2-40B4-BE49-F238E27FC236}">
+                  <a16:creationId xmlns:a16="http://schemas.microsoft.com/office/drawing/2014/main" id="{BB9110CE-F8A9-AFD5-A836-6431D6AD5927}"/>
+                </a:ext>
+              </a:extLst>
+            </p:cNvPr>
+            <p:cNvSpPr/>
+            <p:nvPr/>
+          </p:nvSpPr>
+          <p:spPr>
+            <a:xfrm>
+              <a:off x="1319246" y="283464"/>
+              <a:ext cx="9918730" cy="5852160"/>
+            </a:xfrm>
+            <a:prstGeom prst="rect">
+              <a:avLst/>
+            </a:prstGeom>
+            <a:solidFill>
+              <a:schemeClr val="bg1"/>
+            </a:solidFill>
+            <a:ln>
+              <a:noFill/>
+            </a:ln>
+          </p:spPr>
+          <p:style>
+            <a:lnRef idx="2">
+              <a:schemeClr val="accent1">
+                <a:shade val="50000"/>
+              </a:schemeClr>
+            </a:lnRef>
+            <a:fillRef idx="1">
+              <a:schemeClr val="accent1"/>
+            </a:fillRef>
+            <a:effectRef idx="0">
+              <a:schemeClr val="accent1"/>
+            </a:effectRef>
+            <a:fontRef idx="minor">
+              <a:schemeClr val="lt1"/>
+            </a:fontRef>
+          </p:style>
+          <p:txBody>
+            <a:bodyPr rtlCol="0" anchor="ctr"/>
+            <a:lstStyle/>
+            <a:p>
+              <a:pPr algn="ctr"/>
+              <a:endParaRPr lang="en-TW"/>
+            </a:p>
+          </p:txBody>
+        </p:sp>
+        <p:sp>
+          <p:nvSpPr>
+            <p:cNvPr id="2" name="Rectangle 1">
+              <a:extLst>
+                <a:ext uri="{FF2B5EF4-FFF2-40B4-BE49-F238E27FC236}">
+                  <a16:creationId xmlns:a16="http://schemas.microsoft.com/office/drawing/2014/main" id="{074BF893-61FD-03FF-AEE1-1F7BE0843268}"/>
+                </a:ext>
+              </a:extLst>
+            </p:cNvPr>
+            <p:cNvSpPr/>
+            <p:nvPr/>
+          </p:nvSpPr>
+          <p:spPr>
+            <a:xfrm>
+              <a:off x="3124200" y="1078992"/>
+              <a:ext cx="7759130" cy="3995928"/>
+            </a:xfrm>
+            <a:prstGeom prst="rect">
+              <a:avLst/>
+            </a:prstGeom>
+            <a:noFill/>
+            <a:ln w="19050">
+              <a:solidFill>
+                <a:schemeClr val="tx1"/>
+              </a:solidFill>
+            </a:ln>
+          </p:spPr>
+          <p:style>
+            <a:lnRef idx="2">
+              <a:schemeClr val="accent1">
+                <a:shade val="50000"/>
+              </a:schemeClr>
+            </a:lnRef>
+            <a:fillRef idx="1">
+              <a:schemeClr val="accent1"/>
+            </a:fillRef>
+            <a:effectRef idx="0">
+              <a:schemeClr val="accent1"/>
+            </a:effectRef>
+            <a:fontRef idx="minor">
+              <a:schemeClr val="lt1"/>
+            </a:fontRef>
+          </p:style>
+          <p:txBody>
+            <a:bodyPr rtlCol="0" anchor="ctr"/>
+            <a:lstStyle/>
+            <a:p>
+              <a:pPr algn="just"/>
+              <a:r>
+                <a:rPr lang="en-US" sz="2000" u="sng" dirty="0">
+                  <a:solidFill>
+                    <a:schemeClr val="accent6">
+                      <a:lumMod val="75000"/>
+                    </a:schemeClr>
+                  </a:solidFill>
+                  <a:latin typeface="Calibri" panose="020F0502020204030204"/>
+                </a:rPr>
+                <a:t>What is the stance of the tweet below with respect to 'Legalization of Abortion'?</a:t>
+              </a:r>
+              <a:r>
+                <a:rPr lang="en-US" sz="2000" dirty="0">
+                  <a:solidFill>
+                    <a:schemeClr val="tx1"/>
+                  </a:solidFill>
+                  <a:latin typeface="Calibri" panose="020F0502020204030204"/>
+                </a:rPr>
+                <a:t> </a:t>
+              </a:r>
+              <a:r>
+                <a:rPr lang="en-US" sz="2000" dirty="0">
+                  <a:solidFill>
+                    <a:srgbClr val="7030A0"/>
+                  </a:solidFill>
+                </a:rPr>
+                <a:t>If we can infer from the tweet that the tweeter supports 'Legalization of Abortion', please label it as </a:t>
+              </a:r>
+              <a:r>
+                <a:rPr lang="en-US" sz="2000" u="sng" dirty="0">
+                  <a:solidFill>
+                    <a:srgbClr val="7030A0"/>
+                  </a:solidFill>
+                </a:rPr>
+                <a:t>'in-favor'</a:t>
+              </a:r>
+              <a:r>
+                <a:rPr lang="en-US" sz="2000" dirty="0">
+                  <a:solidFill>
+                    <a:srgbClr val="7030A0"/>
+                  </a:solidFill>
+                </a:rPr>
+                <a:t>. If we can infer from the tweet that the tweeter is against 'Legalization of Abortion', please label is as </a:t>
+              </a:r>
+              <a:r>
+                <a:rPr lang="en-US" sz="2000" u="sng" dirty="0">
+                  <a:solidFill>
+                    <a:srgbClr val="7030A0"/>
+                  </a:solidFill>
+                </a:rPr>
+                <a:t>'against'</a:t>
+              </a:r>
+              <a:r>
+                <a:rPr lang="en-US" sz="2000" dirty="0">
+                  <a:solidFill>
+                    <a:srgbClr val="7030A0"/>
+                  </a:solidFill>
+                </a:rPr>
+                <a:t>. If we can infer from the tweet that the tweeter has a neutral stance towards 'Legalization of Abortion', please label it as </a:t>
+              </a:r>
+              <a:r>
+                <a:rPr lang="en-US" sz="2000" u="sng" dirty="0">
+                  <a:solidFill>
+                    <a:srgbClr val="7030A0"/>
+                  </a:solidFill>
+                </a:rPr>
+                <a:t>'neutral-or-unclear'</a:t>
+              </a:r>
+              <a:r>
+                <a:rPr lang="en-US" sz="2000" dirty="0">
+                  <a:solidFill>
+                    <a:srgbClr val="7030A0"/>
+                  </a:solidFill>
+                </a:rPr>
+                <a:t>. If there is no clue in the tweet to reveal the stance of the tweeter towards 'Legalization of Abortion', please also label is as </a:t>
+              </a:r>
+              <a:r>
+                <a:rPr lang="en-US" sz="2000" u="sng" dirty="0">
+                  <a:solidFill>
+                    <a:srgbClr val="7030A0"/>
+                  </a:solidFill>
+                </a:rPr>
+                <a:t>'neutral-or-unclear'</a:t>
+              </a:r>
+              <a:r>
+                <a:rPr lang="en-US" sz="2000" dirty="0">
+                  <a:solidFill>
+                    <a:srgbClr val="7030A0"/>
+                  </a:solidFill>
+                </a:rPr>
+                <a:t>.</a:t>
+              </a:r>
+              <a:r>
+                <a:rPr lang="en-US" sz="1600" dirty="0">
+                  <a:solidFill>
+                    <a:srgbClr val="7030A0"/>
+                  </a:solidFill>
+                </a:rPr>
+                <a:t> </a:t>
+              </a:r>
+              <a:r>
+                <a:rPr lang="en-US" sz="1600" dirty="0">
+                  <a:solidFill>
+                    <a:prstClr val="black"/>
+                  </a:solidFill>
+                  <a:latin typeface="Calibri" panose="020F0502020204030204"/>
+                </a:rPr>
+                <a:t>Please use exactly one word from the following 3 categories to label it: </a:t>
+              </a:r>
+              <a:r>
+                <a:rPr lang="en-US" sz="2000" u="sng" dirty="0">
+                  <a:solidFill>
+                    <a:srgbClr val="C00000"/>
+                  </a:solidFill>
+                  <a:latin typeface="Calibri" panose="020F0502020204030204"/>
+                </a:rPr>
+                <a:t>'in-favor', 'against', 'neutral-or-unclear'.</a:t>
+              </a:r>
+              <a:r>
+                <a:rPr lang="en-US" sz="2000" dirty="0">
+                  <a:solidFill>
+                    <a:prstClr val="black"/>
+                  </a:solidFill>
+                  <a:latin typeface="Calibri" panose="020F0502020204030204"/>
+                </a:rPr>
+                <a:t> </a:t>
+              </a:r>
+              <a:r>
+                <a:rPr lang="en-US" sz="1600" dirty="0">
+                  <a:solidFill>
+                    <a:prstClr val="black"/>
+                  </a:solidFill>
+                  <a:latin typeface="Calibri" panose="020F0502020204030204"/>
+                </a:rPr>
+                <a:t>Here is the tweet: </a:t>
+              </a:r>
+              <a:r>
+                <a:rPr lang="en-US" sz="2000" dirty="0">
+                  <a:solidFill>
+                    <a:schemeClr val="accent5">
+                      <a:lumMod val="75000"/>
+                    </a:schemeClr>
+                  </a:solidFill>
+                  <a:latin typeface="Calibri" panose="020F0502020204030204"/>
+                </a:rPr>
+                <a:t>“</a:t>
+              </a:r>
+              <a:r>
+                <a:rPr lang="en-US" sz="2000" i="1" dirty="0">
+                  <a:solidFill>
+                    <a:schemeClr val="accent5">
+                      <a:lumMod val="75000"/>
+                    </a:schemeClr>
+                  </a:solidFill>
+                  <a:latin typeface="Calibri" panose="020F0502020204030204"/>
+                </a:rPr>
+                <a:t>It's so brilliant that #</a:t>
+              </a:r>
+              <a:r>
+                <a:rPr lang="en-US" sz="2000" i="1" dirty="0" err="1">
+                  <a:solidFill>
+                    <a:schemeClr val="accent5">
+                      <a:lumMod val="75000"/>
+                    </a:schemeClr>
+                  </a:solidFill>
+                  <a:latin typeface="Calibri" panose="020F0502020204030204"/>
+                </a:rPr>
+                <a:t>lovewins</a:t>
+              </a:r>
+              <a:r>
+                <a:rPr lang="en-US" sz="2000" i="1" dirty="0">
+                  <a:solidFill>
+                    <a:schemeClr val="accent5">
+                      <a:lumMod val="75000"/>
+                    </a:schemeClr>
+                  </a:solidFill>
+                  <a:latin typeface="Calibri" panose="020F0502020204030204"/>
+                </a:rPr>
+                <a:t> - now extend the equality to women's rights #</a:t>
+              </a:r>
+              <a:r>
+                <a:rPr lang="en-US" sz="2000" i="1" dirty="0" err="1">
+                  <a:solidFill>
+                    <a:schemeClr val="accent5">
+                      <a:lumMod val="75000"/>
+                    </a:schemeClr>
+                  </a:solidFill>
+                  <a:latin typeface="Calibri" panose="020F0502020204030204"/>
+                </a:rPr>
+                <a:t>abortionrights</a:t>
+              </a:r>
+              <a:r>
+                <a:rPr lang="en-US" sz="2000" i="1" dirty="0">
+                  <a:solidFill>
+                    <a:schemeClr val="accent5">
+                      <a:lumMod val="75000"/>
+                    </a:schemeClr>
+                  </a:solidFill>
+                  <a:latin typeface="Calibri" panose="020F0502020204030204"/>
+                </a:rPr>
+                <a:t>.</a:t>
+              </a:r>
+              <a:r>
+                <a:rPr lang="en-US" sz="2000" dirty="0">
+                  <a:solidFill>
+                    <a:schemeClr val="accent5">
+                      <a:lumMod val="75000"/>
+                    </a:schemeClr>
+                  </a:solidFill>
+                  <a:latin typeface="Calibri" panose="020F0502020204030204"/>
+                </a:rPr>
+                <a:t>”</a:t>
+              </a:r>
+              <a:r>
+                <a:rPr lang="en-US" sz="2000" dirty="0">
+                  <a:solidFill>
+                    <a:prstClr val="black"/>
+                  </a:solidFill>
+                  <a:latin typeface="Calibri" panose="020F0502020204030204"/>
+                </a:rPr>
+                <a:t> </a:t>
+              </a:r>
+              <a:r>
+                <a:rPr lang="en-US" sz="1600" dirty="0">
+                  <a:solidFill>
+                    <a:prstClr val="black"/>
+                  </a:solidFill>
+                  <a:latin typeface="Calibri" panose="020F0502020204030204"/>
+                </a:rPr>
+                <a:t>The stance of the tweet is: </a:t>
+              </a:r>
+            </a:p>
+          </p:txBody>
+        </p:sp>
+        <p:sp>
+          <p:nvSpPr>
+            <p:cNvPr id="8" name="TextBox 7">
+              <a:extLst>
+                <a:ext uri="{FF2B5EF4-FFF2-40B4-BE49-F238E27FC236}">
+                  <a16:creationId xmlns:a16="http://schemas.microsoft.com/office/drawing/2014/main" id="{8CFAF8A9-36DF-56D8-7A8C-95D2A67A0DAD}"/>
+                </a:ext>
+              </a:extLst>
+            </p:cNvPr>
+            <p:cNvSpPr txBox="1"/>
+            <p:nvPr/>
+          </p:nvSpPr>
+          <p:spPr>
+            <a:xfrm>
+              <a:off x="3132805" y="446851"/>
+              <a:ext cx="2254981" cy="400110"/>
+            </a:xfrm>
+            <a:prstGeom prst="rect">
+              <a:avLst/>
+            </a:prstGeom>
+            <a:noFill/>
+          </p:spPr>
+          <p:txBody>
+            <a:bodyPr wrap="square" rtlCol="0">
+              <a:spAutoFit/>
+            </a:bodyPr>
+            <a:lstStyle/>
+            <a:p>
+              <a:pPr algn="ctr"/>
+              <a:r>
+                <a:rPr lang="en-TW" sz="2000" dirty="0">
+                  <a:solidFill>
+                    <a:schemeClr val="accent6">
+                      <a:lumMod val="75000"/>
+                    </a:schemeClr>
+                  </a:solidFill>
+                  <a:latin typeface="Calibri" panose="020F0502020204030204"/>
+                </a:rPr>
+                <a:t>Task Description</a:t>
+              </a:r>
+            </a:p>
+          </p:txBody>
+        </p:sp>
+        <p:cxnSp>
+          <p:nvCxnSpPr>
+            <p:cNvPr id="10" name="Straight Arrow Connector 9">
+              <a:extLst>
+                <a:ext uri="{FF2B5EF4-FFF2-40B4-BE49-F238E27FC236}">
+                  <a16:creationId xmlns:a16="http://schemas.microsoft.com/office/drawing/2014/main" id="{EE134B28-38C3-FEBC-76D0-E2D82096689D}"/>
+                </a:ext>
+              </a:extLst>
+            </p:cNvPr>
+            <p:cNvCxnSpPr>
+              <a:cxnSpLocks/>
+            </p:cNvCxnSpPr>
+            <p:nvPr/>
+          </p:nvCxnSpPr>
+          <p:spPr>
+            <a:xfrm>
+              <a:off x="4260296" y="792097"/>
+              <a:ext cx="11922" cy="460630"/>
+            </a:xfrm>
+            <a:prstGeom prst="straightConnector1">
+              <a:avLst/>
+            </a:prstGeom>
+            <a:ln w="28575">
+              <a:solidFill>
+                <a:schemeClr val="accent6">
+                  <a:lumMod val="75000"/>
+                </a:schemeClr>
+              </a:solidFill>
+              <a:tailEnd type="triangle"/>
+            </a:ln>
+          </p:spPr>
+          <p:style>
+            <a:lnRef idx="1">
+              <a:schemeClr val="accent1"/>
+            </a:lnRef>
+            <a:fillRef idx="0">
+              <a:schemeClr val="accent1"/>
+            </a:fillRef>
+            <a:effectRef idx="0">
+              <a:schemeClr val="accent1"/>
+            </a:effectRef>
+            <a:fontRef idx="minor">
+              <a:schemeClr val="tx1"/>
+            </a:fontRef>
+          </p:style>
+        </p:cxnSp>
+        <p:sp>
+          <p:nvSpPr>
+            <p:cNvPr id="12" name="TextBox 11">
+              <a:extLst>
+                <a:ext uri="{FF2B5EF4-FFF2-40B4-BE49-F238E27FC236}">
+                  <a16:creationId xmlns:a16="http://schemas.microsoft.com/office/drawing/2014/main" id="{E087CB6D-9D82-F95C-9972-DA4C06707291}"/>
+                </a:ext>
+              </a:extLst>
+            </p:cNvPr>
+            <p:cNvSpPr txBox="1"/>
+            <p:nvPr/>
+          </p:nvSpPr>
+          <p:spPr>
+            <a:xfrm>
+              <a:off x="1319245" y="3559242"/>
+              <a:ext cx="1813560" cy="400110"/>
+            </a:xfrm>
+            <a:prstGeom prst="rect">
+              <a:avLst/>
+            </a:prstGeom>
+            <a:noFill/>
+          </p:spPr>
+          <p:txBody>
+            <a:bodyPr wrap="square" rtlCol="0">
+              <a:spAutoFit/>
+            </a:bodyPr>
+            <a:lstStyle/>
+            <a:p>
+              <a:pPr algn="ctr"/>
+              <a:r>
+                <a:rPr lang="en-TW" sz="2000" dirty="0">
+                  <a:solidFill>
+                    <a:srgbClr val="C00000"/>
+                  </a:solidFill>
+                  <a:latin typeface="Calibri" panose="020F0502020204030204"/>
+                </a:rPr>
+                <a:t>Possible Labels</a:t>
+              </a:r>
+            </a:p>
+          </p:txBody>
+        </p:sp>
+        <p:cxnSp>
+          <p:nvCxnSpPr>
+            <p:cNvPr id="13" name="Straight Arrow Connector 12">
+              <a:extLst>
+                <a:ext uri="{FF2B5EF4-FFF2-40B4-BE49-F238E27FC236}">
+                  <a16:creationId xmlns:a16="http://schemas.microsoft.com/office/drawing/2014/main" id="{9E9A7B65-F9B2-B727-F48E-F0D0FED1DD35}"/>
+                </a:ext>
+              </a:extLst>
+            </p:cNvPr>
+            <p:cNvCxnSpPr>
+              <a:cxnSpLocks/>
+            </p:cNvCxnSpPr>
+            <p:nvPr/>
+          </p:nvCxnSpPr>
+          <p:spPr>
+            <a:xfrm>
+              <a:off x="2852928" y="3959352"/>
+              <a:ext cx="1084818" cy="131446"/>
+            </a:xfrm>
+            <a:prstGeom prst="straightConnector1">
+              <a:avLst/>
+            </a:prstGeom>
+            <a:ln w="28575">
+              <a:solidFill>
+                <a:srgbClr val="C00000"/>
+              </a:solidFill>
+              <a:tailEnd type="triangle"/>
+            </a:ln>
+          </p:spPr>
+          <p:style>
+            <a:lnRef idx="1">
+              <a:schemeClr val="accent1"/>
+            </a:lnRef>
+            <a:fillRef idx="0">
+              <a:schemeClr val="accent1"/>
+            </a:fillRef>
+            <a:effectRef idx="0">
+              <a:schemeClr val="accent1"/>
+            </a:effectRef>
+            <a:fontRef idx="minor">
+              <a:schemeClr val="tx1"/>
+            </a:fontRef>
+          </p:style>
+        </p:cxnSp>
+        <p:sp>
+          <p:nvSpPr>
+            <p:cNvPr id="17" name="TextBox 16">
+              <a:extLst>
+                <a:ext uri="{FF2B5EF4-FFF2-40B4-BE49-F238E27FC236}">
+                  <a16:creationId xmlns:a16="http://schemas.microsoft.com/office/drawing/2014/main" id="{7203F0DB-5576-9F4E-AFF9-CB1428296E75}"/>
+                </a:ext>
+              </a:extLst>
+            </p:cNvPr>
+            <p:cNvSpPr txBox="1"/>
+            <p:nvPr/>
+          </p:nvSpPr>
+          <p:spPr>
+            <a:xfrm>
+              <a:off x="3047461" y="5610387"/>
+              <a:ext cx="2254981" cy="400110"/>
+            </a:xfrm>
+            <a:prstGeom prst="rect">
+              <a:avLst/>
+            </a:prstGeom>
+            <a:noFill/>
+          </p:spPr>
+          <p:txBody>
+            <a:bodyPr wrap="square" rtlCol="0">
+              <a:spAutoFit/>
+            </a:bodyPr>
+            <a:lstStyle/>
+            <a:p>
+              <a:pPr algn="ctr"/>
+              <a:r>
+                <a:rPr lang="en-TW" sz="2000" dirty="0">
+                  <a:solidFill>
+                    <a:schemeClr val="accent5">
+                      <a:lumMod val="75000"/>
+                    </a:schemeClr>
+                  </a:solidFill>
+                  <a:latin typeface="Calibri" panose="020F0502020204030204"/>
+                </a:rPr>
+                <a:t>Tweet of Interest</a:t>
+              </a:r>
+            </a:p>
+          </p:txBody>
+        </p:sp>
+        <p:cxnSp>
+          <p:nvCxnSpPr>
+            <p:cNvPr id="18" name="Straight Arrow Connector 17">
+              <a:extLst>
+                <a:ext uri="{FF2B5EF4-FFF2-40B4-BE49-F238E27FC236}">
+                  <a16:creationId xmlns:a16="http://schemas.microsoft.com/office/drawing/2014/main" id="{7C3ECF62-DF12-4B49-6EA5-F8A7FDB0AEFE}"/>
+                </a:ext>
+              </a:extLst>
+            </p:cNvPr>
+            <p:cNvCxnSpPr>
+              <a:cxnSpLocks/>
+              <a:stCxn id="17" idx="0"/>
+            </p:cNvCxnSpPr>
+            <p:nvPr/>
+          </p:nvCxnSpPr>
+          <p:spPr>
+            <a:xfrm flipH="1" flipV="1">
+              <a:off x="4174951" y="4921155"/>
+              <a:ext cx="1" cy="689232"/>
+            </a:xfrm>
+            <a:prstGeom prst="straightConnector1">
+              <a:avLst/>
+            </a:prstGeom>
+            <a:ln w="28575">
+              <a:solidFill>
+                <a:schemeClr val="accent5">
+                  <a:lumMod val="75000"/>
+                </a:schemeClr>
+              </a:solidFill>
+              <a:tailEnd type="triangle"/>
+            </a:ln>
+          </p:spPr>
+          <p:style>
+            <a:lnRef idx="1">
+              <a:schemeClr val="accent1"/>
+            </a:lnRef>
+            <a:fillRef idx="0">
+              <a:schemeClr val="accent1"/>
+            </a:fillRef>
+            <a:effectRef idx="0">
+              <a:schemeClr val="accent1"/>
+            </a:effectRef>
+            <a:fontRef idx="minor">
+              <a:schemeClr val="tx1"/>
+            </a:fontRef>
+          </p:style>
+        </p:cxnSp>
+        <p:sp>
+          <p:nvSpPr>
+            <p:cNvPr id="20" name="TextBox 19">
+              <a:extLst>
+                <a:ext uri="{FF2B5EF4-FFF2-40B4-BE49-F238E27FC236}">
+                  <a16:creationId xmlns:a16="http://schemas.microsoft.com/office/drawing/2014/main" id="{AB22EE7E-9C94-7E3D-7817-69851CED9248}"/>
+                </a:ext>
+              </a:extLst>
+            </p:cNvPr>
+            <p:cNvSpPr txBox="1"/>
+            <p:nvPr/>
+          </p:nvSpPr>
+          <p:spPr>
+            <a:xfrm>
+              <a:off x="1319245" y="2166495"/>
+              <a:ext cx="1813560" cy="707886"/>
+            </a:xfrm>
+            <a:prstGeom prst="rect">
+              <a:avLst/>
+            </a:prstGeom>
+            <a:noFill/>
+          </p:spPr>
+          <p:txBody>
+            <a:bodyPr wrap="square" rtlCol="0">
+              <a:spAutoFit/>
+            </a:bodyPr>
+            <a:lstStyle/>
+            <a:p>
+              <a:pPr algn="ctr"/>
+              <a:r>
+                <a:rPr lang="en-TW" sz="2000" dirty="0">
+                  <a:solidFill>
+                    <a:srgbClr val="7030A0"/>
+                  </a:solidFill>
+                </a:rPr>
+                <a:t>Label Definitions</a:t>
+              </a:r>
+            </a:p>
+          </p:txBody>
+        </p:sp>
+        <p:cxnSp>
+          <p:nvCxnSpPr>
+            <p:cNvPr id="21" name="Straight Arrow Connector 20">
+              <a:extLst>
+                <a:ext uri="{FF2B5EF4-FFF2-40B4-BE49-F238E27FC236}">
+                  <a16:creationId xmlns:a16="http://schemas.microsoft.com/office/drawing/2014/main" id="{3F81D171-8AC5-5E9A-1840-CA94317481F5}"/>
+                </a:ext>
+              </a:extLst>
+            </p:cNvPr>
+            <p:cNvCxnSpPr>
+              <a:cxnSpLocks/>
+            </p:cNvCxnSpPr>
+            <p:nvPr/>
+          </p:nvCxnSpPr>
+          <p:spPr>
+            <a:xfrm>
+              <a:off x="2852928" y="2505581"/>
+              <a:ext cx="365760" cy="69539"/>
+            </a:xfrm>
+            <a:prstGeom prst="straightConnector1">
+              <a:avLst/>
+            </a:prstGeom>
+            <a:ln w="28575">
+              <a:solidFill>
+                <a:srgbClr val="7030A0"/>
+              </a:solidFill>
+              <a:tailEnd type="triangle"/>
+            </a:ln>
+          </p:spPr>
+          <p:style>
+            <a:lnRef idx="1">
+              <a:schemeClr val="accent1"/>
+            </a:lnRef>
+            <a:fillRef idx="0">
+              <a:schemeClr val="accent1"/>
+            </a:fillRef>
+            <a:effectRef idx="0">
+              <a:schemeClr val="accent1"/>
+            </a:effectRef>
+            <a:fontRef idx="minor">
+              <a:schemeClr val="tx1"/>
+            </a:fontRef>
+          </p:style>
+        </p:cxnSp>
+      </p:grpSp>
+    </p:spTree>
+    <p:extLst>
+      <p:ext uri="{BB962C8B-B14F-4D97-AF65-F5344CB8AC3E}">
+        <p14:creationId xmlns:p14="http://schemas.microsoft.com/office/powerpoint/2010/main" val="971788286"/>
       </p:ext>
     </p:extLst>
   </p:cSld>

</xml_diff>